<commit_message>
schemas figures et amelioration E2
</commit_message>
<xml_diff>
--- a/ORAL/SCHEMAS.pptx
+++ b/ORAL/SCHEMAS.pptx
@@ -5,11 +5,14 @@
     <p:sldMasterId id="2147483648" r:id="rId1"/>
   </p:sldMasterIdLst>
   <p:notesMasterIdLst>
-    <p:notesMasterId r:id="rId4"/>
+    <p:notesMasterId r:id="rId7"/>
   </p:notesMasterIdLst>
   <p:sldIdLst>
     <p:sldId id="257" r:id="rId2"/>
     <p:sldId id="258" r:id="rId3"/>
+    <p:sldId id="259" r:id="rId4"/>
+    <p:sldId id="260" r:id="rId5"/>
+    <p:sldId id="261" r:id="rId6"/>
   </p:sldIdLst>
   <p:sldSz cx="9144000" cy="6858000" type="screen4x3"/>
   <p:notesSz cx="6858000" cy="9144000"/>
@@ -193,7 +196,8 @@
           <a:p>
             <a:fld id="{B5BCB4D3-EF4D-4062-BFBB-58EC45B44019}" type="datetimeFigureOut">
               <a:rPr lang="fr-FR" smtClean="0"/>
-              <a:t>15/01/2023</a:t>
+              <a:pPr/>
+              <a:t>18/01/2023</a:t>
             </a:fld>
             <a:endParaRPr lang="fr-FR"/>
           </a:p>
@@ -354,6 +358,7 @@
           <a:p>
             <a:fld id="{02C31375-F70E-42F7-BC71-4584604209AF}" type="slidenum">
               <a:rPr lang="fr-FR" smtClean="0"/>
+              <a:pPr/>
               <a:t>‹N°›</a:t>
             </a:fld>
             <a:endParaRPr lang="fr-FR"/>
@@ -525,7 +530,90 @@
           <a:p>
             <a:fld id="{02C31375-F70E-42F7-BC71-4584604209AF}" type="slidenum">
               <a:rPr lang="fr-FR" smtClean="0"/>
+              <a:pPr/>
               <a:t>1</a:t>
+            </a:fld>
+            <a:endParaRPr lang="fr-FR"/>
+          </a:p>
+        </p:txBody>
+      </p:sp>
+    </p:spTree>
+  </p:cSld>
+  <p:clrMapOvr>
+    <a:masterClrMapping/>
+  </p:clrMapOvr>
+</p:notes>
+</file>
+
+<file path=ppt/notesSlides/notesSlide2.xml><?xml version="1.0" encoding="utf-8"?>
+<p:notes xmlns:a="http://schemas.openxmlformats.org/drawingml/2006/main" xmlns:r="http://schemas.openxmlformats.org/officeDocument/2006/relationships" xmlns:p="http://schemas.openxmlformats.org/presentationml/2006/main">
+  <p:cSld>
+    <p:spTree>
+      <p:nvGrpSpPr>
+        <p:cNvPr id="1" name=""/>
+        <p:cNvGrpSpPr/>
+        <p:nvPr/>
+      </p:nvGrpSpPr>
+      <p:grpSpPr>
+        <a:xfrm>
+          <a:off x="0" y="0"/>
+          <a:ext cx="0" cy="0"/>
+          <a:chOff x="0" y="0"/>
+          <a:chExt cx="0" cy="0"/>
+        </a:xfrm>
+      </p:grpSpPr>
+      <p:sp>
+        <p:nvSpPr>
+          <p:cNvPr id="2" name="Espace réservé de l'image des diapositives 1"/>
+          <p:cNvSpPr>
+            <a:spLocks noGrp="1" noRot="1" noChangeAspect="1"/>
+          </p:cNvSpPr>
+          <p:nvPr>
+            <p:ph type="sldImg"/>
+          </p:nvPr>
+        </p:nvSpPr>
+        <p:spPr/>
+      </p:sp>
+      <p:sp>
+        <p:nvSpPr>
+          <p:cNvPr id="3" name="Espace réservé des commentaires 2"/>
+          <p:cNvSpPr>
+            <a:spLocks noGrp="1"/>
+          </p:cNvSpPr>
+          <p:nvPr>
+            <p:ph type="body" idx="1"/>
+          </p:nvPr>
+        </p:nvSpPr>
+        <p:spPr/>
+        <p:txBody>
+          <a:bodyPr>
+            <a:normAutofit/>
+          </a:bodyPr>
+          <a:lstStyle/>
+          <a:p>
+            <a:endParaRPr lang="fr-FR" dirty="0"/>
+          </a:p>
+        </p:txBody>
+      </p:sp>
+      <p:sp>
+        <p:nvSpPr>
+          <p:cNvPr id="4" name="Espace réservé du numéro de diapositive 3"/>
+          <p:cNvSpPr>
+            <a:spLocks noGrp="1"/>
+          </p:cNvSpPr>
+          <p:nvPr>
+            <p:ph type="sldNum" sz="quarter" idx="10"/>
+          </p:nvPr>
+        </p:nvSpPr>
+        <p:spPr/>
+        <p:txBody>
+          <a:bodyPr/>
+          <a:lstStyle/>
+          <a:p>
+            <a:fld id="{02C31375-F70E-42F7-BC71-4584604209AF}" type="slidenum">
+              <a:rPr lang="fr-FR" smtClean="0"/>
+              <a:pPr/>
+              <a:t>4</a:t>
             </a:fld>
             <a:endParaRPr lang="fr-FR"/>
           </a:p>
@@ -720,7 +808,8 @@
           <a:p>
             <a:fld id="{8F78C57A-1399-4A5D-B1B1-22A87A8F5ADA}" type="datetimeFigureOut">
               <a:rPr lang="fr-FR" smtClean="0"/>
-              <a:t>12/01/2023</a:t>
+              <a:pPr/>
+              <a:t>18/01/2023</a:t>
             </a:fld>
             <a:endParaRPr lang="fr-FR"/>
           </a:p>
@@ -762,6 +851,7 @@
           <a:p>
             <a:fld id="{FD4F2D0F-C937-4977-8B27-95CF994CDC3C}" type="slidenum">
               <a:rPr lang="fr-FR" smtClean="0"/>
+              <a:pPr/>
               <a:t>‹N°›</a:t>
             </a:fld>
             <a:endParaRPr lang="fr-FR"/>
@@ -885,7 +975,8 @@
           <a:p>
             <a:fld id="{8F78C57A-1399-4A5D-B1B1-22A87A8F5ADA}" type="datetimeFigureOut">
               <a:rPr lang="fr-FR" smtClean="0"/>
-              <a:t>12/01/2023</a:t>
+              <a:pPr/>
+              <a:t>18/01/2023</a:t>
             </a:fld>
             <a:endParaRPr lang="fr-FR"/>
           </a:p>
@@ -927,6 +1018,7 @@
           <a:p>
             <a:fld id="{FD4F2D0F-C937-4977-8B27-95CF994CDC3C}" type="slidenum">
               <a:rPr lang="fr-FR" smtClean="0"/>
+              <a:pPr/>
               <a:t>‹N°›</a:t>
             </a:fld>
             <a:endParaRPr lang="fr-FR"/>
@@ -1060,7 +1152,8 @@
           <a:p>
             <a:fld id="{8F78C57A-1399-4A5D-B1B1-22A87A8F5ADA}" type="datetimeFigureOut">
               <a:rPr lang="fr-FR" smtClean="0"/>
-              <a:t>12/01/2023</a:t>
+              <a:pPr/>
+              <a:t>18/01/2023</a:t>
             </a:fld>
             <a:endParaRPr lang="fr-FR"/>
           </a:p>
@@ -1102,6 +1195,7 @@
           <a:p>
             <a:fld id="{FD4F2D0F-C937-4977-8B27-95CF994CDC3C}" type="slidenum">
               <a:rPr lang="fr-FR" smtClean="0"/>
+              <a:pPr/>
               <a:t>‹N°›</a:t>
             </a:fld>
             <a:endParaRPr lang="fr-FR"/>
@@ -1225,7 +1319,8 @@
           <a:p>
             <a:fld id="{8F78C57A-1399-4A5D-B1B1-22A87A8F5ADA}" type="datetimeFigureOut">
               <a:rPr lang="fr-FR" smtClean="0"/>
-              <a:t>12/01/2023</a:t>
+              <a:pPr/>
+              <a:t>18/01/2023</a:t>
             </a:fld>
             <a:endParaRPr lang="fr-FR"/>
           </a:p>
@@ -1267,6 +1362,7 @@
           <a:p>
             <a:fld id="{FD4F2D0F-C937-4977-8B27-95CF994CDC3C}" type="slidenum">
               <a:rPr lang="fr-FR" smtClean="0"/>
+              <a:pPr/>
               <a:t>‹N°›</a:t>
             </a:fld>
             <a:endParaRPr lang="fr-FR"/>
@@ -1466,7 +1562,8 @@
           <a:p>
             <a:fld id="{8F78C57A-1399-4A5D-B1B1-22A87A8F5ADA}" type="datetimeFigureOut">
               <a:rPr lang="fr-FR" smtClean="0"/>
-              <a:t>12/01/2023</a:t>
+              <a:pPr/>
+              <a:t>18/01/2023</a:t>
             </a:fld>
             <a:endParaRPr lang="fr-FR"/>
           </a:p>
@@ -1508,6 +1605,7 @@
           <a:p>
             <a:fld id="{FD4F2D0F-C937-4977-8B27-95CF994CDC3C}" type="slidenum">
               <a:rPr lang="fr-FR" smtClean="0"/>
+              <a:pPr/>
               <a:t>‹N°›</a:t>
             </a:fld>
             <a:endParaRPr lang="fr-FR"/>
@@ -1749,7 +1847,8 @@
           <a:p>
             <a:fld id="{8F78C57A-1399-4A5D-B1B1-22A87A8F5ADA}" type="datetimeFigureOut">
               <a:rPr lang="fr-FR" smtClean="0"/>
-              <a:t>12/01/2023</a:t>
+              <a:pPr/>
+              <a:t>18/01/2023</a:t>
             </a:fld>
             <a:endParaRPr lang="fr-FR"/>
           </a:p>
@@ -1791,6 +1890,7 @@
           <a:p>
             <a:fld id="{FD4F2D0F-C937-4977-8B27-95CF994CDC3C}" type="slidenum">
               <a:rPr lang="fr-FR" smtClean="0"/>
+              <a:pPr/>
               <a:t>‹N°›</a:t>
             </a:fld>
             <a:endParaRPr lang="fr-FR"/>
@@ -2166,7 +2266,8 @@
           <a:p>
             <a:fld id="{8F78C57A-1399-4A5D-B1B1-22A87A8F5ADA}" type="datetimeFigureOut">
               <a:rPr lang="fr-FR" smtClean="0"/>
-              <a:t>12/01/2023</a:t>
+              <a:pPr/>
+              <a:t>18/01/2023</a:t>
             </a:fld>
             <a:endParaRPr lang="fr-FR"/>
           </a:p>
@@ -2208,6 +2309,7 @@
           <a:p>
             <a:fld id="{FD4F2D0F-C937-4977-8B27-95CF994CDC3C}" type="slidenum">
               <a:rPr lang="fr-FR" smtClean="0"/>
+              <a:pPr/>
               <a:t>‹N°›</a:t>
             </a:fld>
             <a:endParaRPr lang="fr-FR"/>
@@ -2279,7 +2381,8 @@
           <a:p>
             <a:fld id="{8F78C57A-1399-4A5D-B1B1-22A87A8F5ADA}" type="datetimeFigureOut">
               <a:rPr lang="fr-FR" smtClean="0"/>
-              <a:t>12/01/2023</a:t>
+              <a:pPr/>
+              <a:t>18/01/2023</a:t>
             </a:fld>
             <a:endParaRPr lang="fr-FR"/>
           </a:p>
@@ -2321,6 +2424,7 @@
           <a:p>
             <a:fld id="{FD4F2D0F-C937-4977-8B27-95CF994CDC3C}" type="slidenum">
               <a:rPr lang="fr-FR" smtClean="0"/>
+              <a:pPr/>
               <a:t>‹N°›</a:t>
             </a:fld>
             <a:endParaRPr lang="fr-FR"/>
@@ -2369,7 +2473,8 @@
           <a:p>
             <a:fld id="{8F78C57A-1399-4A5D-B1B1-22A87A8F5ADA}" type="datetimeFigureOut">
               <a:rPr lang="fr-FR" smtClean="0"/>
-              <a:t>12/01/2023</a:t>
+              <a:pPr/>
+              <a:t>18/01/2023</a:t>
             </a:fld>
             <a:endParaRPr lang="fr-FR"/>
           </a:p>
@@ -2411,6 +2516,7 @@
           <a:p>
             <a:fld id="{FD4F2D0F-C937-4977-8B27-95CF994CDC3C}" type="slidenum">
               <a:rPr lang="fr-FR" smtClean="0"/>
+              <a:pPr/>
               <a:t>‹N°›</a:t>
             </a:fld>
             <a:endParaRPr lang="fr-FR"/>
@@ -2641,7 +2747,8 @@
           <a:p>
             <a:fld id="{8F78C57A-1399-4A5D-B1B1-22A87A8F5ADA}" type="datetimeFigureOut">
               <a:rPr lang="fr-FR" smtClean="0"/>
-              <a:t>12/01/2023</a:t>
+              <a:pPr/>
+              <a:t>18/01/2023</a:t>
             </a:fld>
             <a:endParaRPr lang="fr-FR"/>
           </a:p>
@@ -2683,6 +2790,7 @@
           <a:p>
             <a:fld id="{FD4F2D0F-C937-4977-8B27-95CF994CDC3C}" type="slidenum">
               <a:rPr lang="fr-FR" smtClean="0"/>
+              <a:pPr/>
               <a:t>‹N°›</a:t>
             </a:fld>
             <a:endParaRPr lang="fr-FR"/>
@@ -2889,7 +2997,8 @@
           <a:p>
             <a:fld id="{8F78C57A-1399-4A5D-B1B1-22A87A8F5ADA}" type="datetimeFigureOut">
               <a:rPr lang="fr-FR" smtClean="0"/>
-              <a:t>12/01/2023</a:t>
+              <a:pPr/>
+              <a:t>18/01/2023</a:t>
             </a:fld>
             <a:endParaRPr lang="fr-FR"/>
           </a:p>
@@ -2931,6 +3040,7 @@
           <a:p>
             <a:fld id="{FD4F2D0F-C937-4977-8B27-95CF994CDC3C}" type="slidenum">
               <a:rPr lang="fr-FR" smtClean="0"/>
+              <a:pPr/>
               <a:t>‹N°›</a:t>
             </a:fld>
             <a:endParaRPr lang="fr-FR"/>
@@ -3097,7 +3207,8 @@
           <a:p>
             <a:fld id="{8F78C57A-1399-4A5D-B1B1-22A87A8F5ADA}" type="datetimeFigureOut">
               <a:rPr lang="fr-FR" smtClean="0"/>
-              <a:t>12/01/2023</a:t>
+              <a:pPr/>
+              <a:t>18/01/2023</a:t>
             </a:fld>
             <a:endParaRPr lang="fr-FR"/>
           </a:p>
@@ -3175,6 +3286,7 @@
           <a:p>
             <a:fld id="{FD4F2D0F-C937-4977-8B27-95CF994CDC3C}" type="slidenum">
               <a:rPr lang="fr-FR" smtClean="0"/>
+              <a:pPr/>
               <a:t>‹N°›</a:t>
             </a:fld>
             <a:endParaRPr lang="fr-FR"/>
@@ -3773,7 +3885,7 @@
           <p:spPr>
             <a:xfrm>
               <a:off x="3143240" y="1916235"/>
-              <a:ext cx="2643206" cy="3370153"/>
+              <a:ext cx="2643206" cy="3154710"/>
             </a:xfrm>
             <a:prstGeom prst="rect">
               <a:avLst/>
@@ -3833,14 +3945,42 @@
                   <a:latin typeface="Verdana" pitchFamily="34" charset="0"/>
                   <a:ea typeface="Verdana" pitchFamily="34" charset="0"/>
                 </a:rPr>
-                <a:t> Under </a:t>
+                <a:t> </a:t>
               </a:r>
               <a:r>
                 <a:rPr lang="fr-FR" sz="1100" i="1" dirty="0" err="1" smtClean="0">
                   <a:latin typeface="Verdana" pitchFamily="34" charset="0"/>
                   <a:ea typeface="Verdana" pitchFamily="34" charset="0"/>
                 </a:rPr>
-                <a:t>Sampling</a:t>
+                <a:t>u</a:t>
+              </a:r>
+              <a:r>
+                <a:rPr lang="fr-FR" sz="1100" i="1" dirty="0" err="1" smtClean="0">
+                  <a:latin typeface="Verdana" pitchFamily="34" charset="0"/>
+                  <a:ea typeface="Verdana" pitchFamily="34" charset="0"/>
+                </a:rPr>
+                <a:t>nder</a:t>
+              </a:r>
+              <a:r>
+                <a:rPr lang="fr-FR" sz="1100" i="1" dirty="0" smtClean="0">
+                  <a:latin typeface="Verdana" pitchFamily="34" charset="0"/>
+                  <a:ea typeface="Verdana" pitchFamily="34" charset="0"/>
+                </a:rPr>
+                <a:t>-</a:t>
+              </a:r>
+              <a:r>
+                <a:rPr lang="fr-FR" sz="1100" i="1" dirty="0" err="1" smtClean="0">
+                  <a:latin typeface="Verdana" pitchFamily="34" charset="0"/>
+                  <a:ea typeface="Verdana" pitchFamily="34" charset="0"/>
+                </a:rPr>
+                <a:t>s</a:t>
+              </a:r>
+              <a:r>
+                <a:rPr lang="fr-FR" sz="1100" i="1" dirty="0" err="1" smtClean="0">
+                  <a:latin typeface="Verdana" pitchFamily="34" charset="0"/>
+                  <a:ea typeface="Verdana" pitchFamily="34" charset="0"/>
+                </a:rPr>
+                <a:t>ampling</a:t>
               </a:r>
               <a:endParaRPr lang="fr-FR" sz="1100" i="1" dirty="0" smtClean="0">
                 <a:latin typeface="Verdana" pitchFamily="34" charset="0"/>
@@ -3870,32 +4010,18 @@
             <a:p>
               <a:pPr algn="ctr"/>
               <a:r>
-                <a:rPr lang="fr-FR" sz="1100" dirty="0" err="1" smtClean="0">
+                <a:rPr lang="fr-FR" sz="1100" dirty="0" smtClean="0">
                   <a:latin typeface="Verdana" pitchFamily="34" charset="0"/>
                   <a:ea typeface="Verdana" pitchFamily="34" charset="0"/>
                 </a:rPr>
-                <a:t>Tokenisation</a:t>
+                <a:t>Suppression </a:t>
               </a:r>
-              <a:endParaRPr lang="fr-FR" sz="1100" dirty="0" smtClean="0">
-                <a:latin typeface="Verdana" pitchFamily="34" charset="0"/>
-                <a:ea typeface="Verdana" pitchFamily="34" charset="0"/>
-              </a:endParaRPr>
-            </a:p>
-            <a:p>
-              <a:pPr algn="ctr"/>
-              <a:endParaRPr lang="fr-FR" sz="300" dirty="0" smtClean="0">
-                <a:latin typeface="Verdana" pitchFamily="34" charset="0"/>
-                <a:ea typeface="Verdana" pitchFamily="34" charset="0"/>
-              </a:endParaRPr>
-            </a:p>
-            <a:p>
-              <a:pPr algn="ctr"/>
               <a:r>
                 <a:rPr lang="fr-FR" sz="1100" dirty="0" smtClean="0">
                   <a:latin typeface="Verdana" pitchFamily="34" charset="0"/>
                   <a:ea typeface="Verdana" pitchFamily="34" charset="0"/>
                 </a:rPr>
-                <a:t>Suppression de la ponctuation</a:t>
+                <a:t>de la ponctuation</a:t>
               </a:r>
             </a:p>
             <a:p>
@@ -3914,6 +4040,27 @@
                 </a:rPr>
                 <a:t>Changement en minuscules</a:t>
               </a:r>
+            </a:p>
+            <a:p>
+              <a:pPr algn="ctr"/>
+              <a:endParaRPr lang="fr-FR" sz="300" dirty="0" smtClean="0">
+                <a:latin typeface="Verdana" pitchFamily="34" charset="0"/>
+                <a:ea typeface="Verdana" pitchFamily="34" charset="0"/>
+              </a:endParaRPr>
+            </a:p>
+            <a:p>
+              <a:pPr algn="ctr"/>
+              <a:r>
+                <a:rPr lang="fr-FR" sz="1100" dirty="0" err="1" smtClean="0">
+                  <a:latin typeface="Verdana" pitchFamily="34" charset="0"/>
+                  <a:ea typeface="Verdana" pitchFamily="34" charset="0"/>
+                </a:rPr>
+                <a:t>Tokenisation</a:t>
+              </a:r>
+              <a:endParaRPr lang="fr-FR" sz="1100" dirty="0" smtClean="0">
+                <a:latin typeface="Verdana" pitchFamily="34" charset="0"/>
+                <a:ea typeface="Verdana" pitchFamily="34" charset="0"/>
+              </a:endParaRPr>
             </a:p>
             <a:p>
               <a:pPr algn="ctr"/>
@@ -4007,7 +4154,7 @@
                 <a:t>(ajout de </a:t>
               </a:r>
               <a:r>
-                <a:rPr lang="fr-FR" sz="1100" dirty="0" err="1" smtClean="0">
+                <a:rPr lang="fr-FR" sz="1100" i="1" dirty="0" err="1" smtClean="0">
                   <a:latin typeface="Verdana" pitchFamily="34" charset="0"/>
                   <a:ea typeface="Verdana" pitchFamily="34" charset="0"/>
                 </a:rPr>
@@ -4144,7 +4291,7 @@
           <p:spPr>
             <a:xfrm>
               <a:off x="8715404" y="3465521"/>
-              <a:ext cx="2643206" cy="861774"/>
+              <a:ext cx="2643206" cy="880110"/>
             </a:xfrm>
             <a:prstGeom prst="rect">
               <a:avLst/>
@@ -4206,28 +4353,45 @@
                   <a:latin typeface="Verdana" pitchFamily="34" charset="0"/>
                   <a:ea typeface="Verdana" pitchFamily="34" charset="0"/>
                 </a:rPr>
-                <a:t>Courbe ROC et AUC</a:t>
+                <a:t>Courbe </a:t>
               </a:r>
-              <a:endParaRPr lang="fr-FR" sz="1100" dirty="0" smtClean="0">
-                <a:latin typeface="Verdana" pitchFamily="34" charset="0"/>
-                <a:ea typeface="Verdana" pitchFamily="34" charset="0"/>
-              </a:endParaRPr>
+              <a:r>
+                <a:rPr lang="fr-FR" sz="1100" i="1" dirty="0" smtClean="0">
+                  <a:latin typeface="Verdana" pitchFamily="34" charset="0"/>
+                  <a:ea typeface="Verdana" pitchFamily="34" charset="0"/>
+                </a:rPr>
+                <a:t>ROC</a:t>
+              </a:r>
+              <a:r>
+                <a:rPr lang="fr-FR" sz="1100" dirty="0" smtClean="0">
+                  <a:latin typeface="Verdana" pitchFamily="34" charset="0"/>
+                  <a:ea typeface="Verdana" pitchFamily="34" charset="0"/>
+                </a:rPr>
+                <a:t> et </a:t>
+              </a:r>
+              <a:r>
+                <a:rPr lang="fr-FR" sz="1100" i="1" dirty="0" smtClean="0">
+                  <a:latin typeface="Verdana" pitchFamily="34" charset="0"/>
+                  <a:ea typeface="Verdana" pitchFamily="34" charset="0"/>
+                </a:rPr>
+                <a:t>AUC</a:t>
+              </a:r>
             </a:p>
           </p:txBody>
         </p:sp>
       </p:grpSp>
       <p:grpSp>
         <p:nvGrpSpPr>
-          <p:cNvPr id="80" name="Groupe 79"/>
+          <p:cNvPr id="47" name="Groupe 46"/>
           <p:cNvGrpSpPr/>
           <p:nvPr/>
         </p:nvGrpSpPr>
         <p:grpSpPr>
           <a:xfrm>
-            <a:off x="6143636" y="428604"/>
-            <a:ext cx="2928958" cy="4286280"/>
-            <a:chOff x="5929322" y="428604"/>
-            <a:chExt cx="2643206" cy="4286280"/>
+            <a:off x="6072198" y="428604"/>
+            <a:ext cx="3060000" cy="4286280"/>
+            <a:chOff x="6072198" y="428604"/>
+            <a:chExt cx="3060000" cy="4286280"/>
           </a:xfrm>
         </p:grpSpPr>
         <p:sp>
@@ -4238,8 +4402,8 @@
           </p:nvSpPr>
           <p:spPr>
             <a:xfrm>
-              <a:off x="5929322" y="428604"/>
-              <a:ext cx="2643206" cy="4286280"/>
+              <a:off x="6143636" y="428604"/>
+              <a:ext cx="2928958" cy="4286280"/>
             </a:xfrm>
             <a:prstGeom prst="rect">
               <a:avLst/>
@@ -4286,8 +4450,8 @@
           </p:nvSpPr>
           <p:spPr>
             <a:xfrm>
-              <a:off x="5929322" y="518678"/>
-              <a:ext cx="2643206" cy="338554"/>
+              <a:off x="6143636" y="518678"/>
+              <a:ext cx="2928958" cy="338554"/>
             </a:xfrm>
             <a:prstGeom prst="rect">
               <a:avLst/>
@@ -4325,8 +4489,8 @@
           </p:nvSpPr>
           <p:spPr>
             <a:xfrm>
-              <a:off x="5929322" y="2347264"/>
-              <a:ext cx="2643206" cy="1938992"/>
+              <a:off x="6072198" y="2357430"/>
+              <a:ext cx="3060000" cy="2108269"/>
             </a:xfrm>
             <a:prstGeom prst="rect">
               <a:avLst/>
@@ -4471,6 +4635,59 @@
                 </a:rPr>
                 <a:t>: </a:t>
               </a:r>
+              <a:endParaRPr lang="fr-FR" sz="1100" dirty="0" smtClean="0">
+                <a:latin typeface="Verdana" pitchFamily="34" charset="0"/>
+                <a:ea typeface="Verdana" pitchFamily="34" charset="0"/>
+              </a:endParaRPr>
+            </a:p>
+            <a:p>
+              <a:pPr algn="ctr"/>
+              <a:r>
+                <a:rPr lang="en-US" sz="1100" dirty="0" err="1" smtClean="0">
+                  <a:latin typeface="Verdana" pitchFamily="34" charset="0"/>
+                  <a:ea typeface="Verdana" pitchFamily="34" charset="0"/>
+                </a:rPr>
+                <a:t>min_delta</a:t>
+              </a:r>
+              <a:r>
+                <a:rPr lang="en-US" sz="1100" dirty="0" smtClean="0">
+                  <a:latin typeface="Verdana" pitchFamily="34" charset="0"/>
+                  <a:ea typeface="Verdana" pitchFamily="34" charset="0"/>
+                </a:rPr>
+                <a:t>=1.10</a:t>
+              </a:r>
+              <a:r>
+                <a:rPr lang="en-US" sz="1100" baseline="30000" dirty="0" smtClean="0">
+                  <a:latin typeface="Verdana" pitchFamily="34" charset="0"/>
+                  <a:ea typeface="Verdana" pitchFamily="34" charset="0"/>
+                </a:rPr>
+                <a:t>-4</a:t>
+              </a:r>
+              <a:r>
+                <a:rPr lang="en-US" sz="1100" dirty="0" smtClean="0">
+                  <a:latin typeface="Verdana" pitchFamily="34" charset="0"/>
+                  <a:ea typeface="Verdana" pitchFamily="34" charset="0"/>
+                </a:rPr>
+                <a:t>, patience=5, </a:t>
+              </a:r>
+              <a:r>
+                <a:rPr lang="en-US" sz="1100" dirty="0" err="1" smtClean="0">
+                  <a:latin typeface="Verdana" pitchFamily="34" charset="0"/>
+                  <a:ea typeface="Verdana" pitchFamily="34" charset="0"/>
+                </a:rPr>
+                <a:t>restore_best_weights</a:t>
+              </a:r>
+              <a:r>
+                <a:rPr lang="en-US" sz="1100" dirty="0" smtClean="0">
+                  <a:latin typeface="Verdana" pitchFamily="34" charset="0"/>
+                  <a:ea typeface="Verdana" pitchFamily="34" charset="0"/>
+                </a:rPr>
+                <a:t>=True</a:t>
+              </a:r>
+              <a:endParaRPr lang="en-US" sz="1100" dirty="0" smtClean="0">
+                <a:latin typeface="Verdana" pitchFamily="34" charset="0"/>
+                <a:ea typeface="Verdana" pitchFamily="34" charset="0"/>
+              </a:endParaRPr>
             </a:p>
             <a:p>
               <a:pPr algn="ctr"/>
@@ -4510,7 +4727,14 @@
                   <a:latin typeface="Verdana" pitchFamily="34" charset="0"/>
                   <a:ea typeface="Verdana" pitchFamily="34" charset="0"/>
                 </a:rPr>
-                <a:t>Taille du dictionnaire : None</a:t>
+                <a:t>Taille du dictionnaire : </a:t>
+              </a:r>
+              <a:r>
+                <a:rPr lang="fr-FR" sz="1100" i="1" dirty="0" smtClean="0">
+                  <a:latin typeface="Verdana" pitchFamily="34" charset="0"/>
+                  <a:ea typeface="Verdana" pitchFamily="34" charset="0"/>
+                </a:rPr>
+                <a:t>None</a:t>
               </a:r>
             </a:p>
             <a:p>
@@ -4529,10 +4753,6 @@
                 </a:rPr>
                 <a:t>Longueur des séquences : 300</a:t>
               </a:r>
-              <a:endParaRPr lang="fr-FR" sz="1100" dirty="0" smtClean="0">
-                <a:latin typeface="Verdana" pitchFamily="34" charset="0"/>
-                <a:ea typeface="Verdana" pitchFamily="34" charset="0"/>
-              </a:endParaRPr>
             </a:p>
           </p:txBody>
         </p:sp>
@@ -6315,6 +6535,2270 @@
           </a:p>
         </p:txBody>
       </p:sp>
+    </p:spTree>
+  </p:cSld>
+  <p:clrMapOvr>
+    <a:masterClrMapping/>
+  </p:clrMapOvr>
+</p:sld>
+</file>
+
+<file path=ppt/slides/slide3.xml><?xml version="1.0" encoding="utf-8"?>
+<p:sld xmlns:a="http://schemas.openxmlformats.org/drawingml/2006/main" xmlns:r="http://schemas.openxmlformats.org/officeDocument/2006/relationships" xmlns:p="http://schemas.openxmlformats.org/presentationml/2006/main">
+  <p:cSld>
+    <p:spTree>
+      <p:nvGrpSpPr>
+        <p:cNvPr id="1" name=""/>
+        <p:cNvGrpSpPr/>
+        <p:nvPr/>
+      </p:nvGrpSpPr>
+      <p:grpSpPr>
+        <a:xfrm>
+          <a:off x="0" y="0"/>
+          <a:ext cx="0" cy="0"/>
+          <a:chOff x="0" y="0"/>
+          <a:chExt cx="0" cy="0"/>
+        </a:xfrm>
+      </p:grpSpPr>
+      <p:pic>
+        <p:nvPicPr>
+          <p:cNvPr id="1026" name="Picture 2" descr="https://lh6.googleusercontent.com/KXIGBJM2CEDjbPUJjtW49gXBYvfVC-RCr8Ly5GVRk5Eeb3vFIF7wtI9N-VZu_5rkiEe1SKqeehLBzQNf2RKc8Z0P9wGwBu1CwjqvHRSJ4Yq1T274hn5BaBAYKluJwnX1GmFmicOjo-srm8lJK2e8jQMDHkioJiw_DJs-nYUZjHTSybbcGGOGaZue1K7OSME5FdZgtHT6ZA"/>
+          <p:cNvPicPr>
+            <a:picLocks noChangeAspect="1" noChangeArrowheads="1"/>
+          </p:cNvPicPr>
+          <p:nvPr/>
+        </p:nvPicPr>
+        <p:blipFill>
+          <a:blip r:embed="rId2"/>
+          <a:srcRect/>
+          <a:stretch>
+            <a:fillRect/>
+          </a:stretch>
+        </p:blipFill>
+        <p:spPr bwMode="auto">
+          <a:xfrm>
+            <a:off x="1000100" y="928670"/>
+            <a:ext cx="4019550" cy="1847851"/>
+          </a:xfrm>
+          <a:prstGeom prst="rect">
+            <a:avLst/>
+          </a:prstGeom>
+          <a:noFill/>
+        </p:spPr>
+      </p:pic>
+    </p:spTree>
+  </p:cSld>
+  <p:clrMapOvr>
+    <a:masterClrMapping/>
+  </p:clrMapOvr>
+</p:sld>
+</file>
+
+<file path=ppt/slides/slide4.xml><?xml version="1.0" encoding="utf-8"?>
+<p:sld xmlns:a="http://schemas.openxmlformats.org/drawingml/2006/main" xmlns:r="http://schemas.openxmlformats.org/officeDocument/2006/relationships" xmlns:p="http://schemas.openxmlformats.org/presentationml/2006/main">
+  <p:cSld>
+    <p:spTree>
+      <p:nvGrpSpPr>
+        <p:cNvPr id="1" name=""/>
+        <p:cNvGrpSpPr/>
+        <p:nvPr/>
+      </p:nvGrpSpPr>
+      <p:grpSpPr>
+        <a:xfrm>
+          <a:off x="0" y="0"/>
+          <a:ext cx="0" cy="0"/>
+          <a:chOff x="0" y="0"/>
+          <a:chExt cx="0" cy="0"/>
+        </a:xfrm>
+      </p:grpSpPr>
+      <p:sp>
+        <p:nvSpPr>
+          <p:cNvPr id="3" name="Rectangle 2"/>
+          <p:cNvSpPr/>
+          <p:nvPr/>
+        </p:nvSpPr>
+        <p:spPr>
+          <a:xfrm>
+            <a:off x="928662" y="857232"/>
+            <a:ext cx="7572396" cy="5214974"/>
+          </a:xfrm>
+          <a:prstGeom prst="rect">
+            <a:avLst/>
+          </a:prstGeom>
+          <a:noFill/>
+          <a:ln w="3175">
+            <a:solidFill>
+              <a:schemeClr val="tx1"/>
+            </a:solidFill>
+          </a:ln>
+        </p:spPr>
+        <p:style>
+          <a:lnRef idx="2">
+            <a:schemeClr val="accent1">
+              <a:shade val="50000"/>
+            </a:schemeClr>
+          </a:lnRef>
+          <a:fillRef idx="1">
+            <a:schemeClr val="accent1"/>
+          </a:fillRef>
+          <a:effectRef idx="0">
+            <a:schemeClr val="accent1"/>
+          </a:effectRef>
+          <a:fontRef idx="minor">
+            <a:schemeClr val="lt1"/>
+          </a:fontRef>
+        </p:style>
+        <p:txBody>
+          <a:bodyPr rtlCol="0" anchor="ctr"/>
+          <a:lstStyle/>
+          <a:p>
+            <a:pPr algn="ctr"/>
+            <a:endParaRPr lang="fr-FR">
+              <a:latin typeface="Arial Narrow" pitchFamily="34" charset="0"/>
+            </a:endParaRPr>
+          </a:p>
+        </p:txBody>
+      </p:sp>
+      <p:sp>
+        <p:nvSpPr>
+          <p:cNvPr id="5" name="Rectangle 4"/>
+          <p:cNvSpPr/>
+          <p:nvPr/>
+        </p:nvSpPr>
+        <p:spPr>
+          <a:xfrm>
+            <a:off x="4286248" y="2285992"/>
+            <a:ext cx="1562112" cy="2366978"/>
+          </a:xfrm>
+          <a:prstGeom prst="rect">
+            <a:avLst/>
+          </a:prstGeom>
+          <a:noFill/>
+          <a:ln w="3175">
+            <a:solidFill>
+              <a:schemeClr val="tx1"/>
+            </a:solidFill>
+          </a:ln>
+        </p:spPr>
+        <p:style>
+          <a:lnRef idx="2">
+            <a:schemeClr val="accent1">
+              <a:shade val="50000"/>
+            </a:schemeClr>
+          </a:lnRef>
+          <a:fillRef idx="1">
+            <a:schemeClr val="accent1"/>
+          </a:fillRef>
+          <a:effectRef idx="0">
+            <a:schemeClr val="accent1"/>
+          </a:effectRef>
+          <a:fontRef idx="minor">
+            <a:schemeClr val="lt1"/>
+          </a:fontRef>
+        </p:style>
+        <p:txBody>
+          <a:bodyPr rtlCol="0" anchor="ctr"/>
+          <a:lstStyle/>
+          <a:p>
+            <a:pPr algn="ctr"/>
+            <a:endParaRPr lang="fr-FR">
+              <a:latin typeface="Arial Narrow" pitchFamily="34" charset="0"/>
+            </a:endParaRPr>
+          </a:p>
+        </p:txBody>
+      </p:sp>
+      <p:sp>
+        <p:nvSpPr>
+          <p:cNvPr id="6" name="ZoneTexte 5"/>
+          <p:cNvSpPr txBox="1"/>
+          <p:nvPr/>
+        </p:nvSpPr>
+        <p:spPr>
+          <a:xfrm>
+            <a:off x="1357290" y="857232"/>
+            <a:ext cx="7143800" cy="369332"/>
+          </a:xfrm>
+          <a:prstGeom prst="rect">
+            <a:avLst/>
+          </a:prstGeom>
+          <a:noFill/>
+        </p:spPr>
+        <p:txBody>
+          <a:bodyPr wrap="square" rtlCol="0">
+            <a:spAutoFit/>
+          </a:bodyPr>
+          <a:lstStyle/>
+          <a:p>
+            <a:pPr algn="ctr"/>
+            <a:r>
+              <a:rPr lang="fr-FR" b="1" dirty="0" smtClean="0">
+                <a:latin typeface="Arial Narrow" pitchFamily="34" charset="0"/>
+                <a:ea typeface="Verdana" pitchFamily="34" charset="0"/>
+              </a:rPr>
+              <a:t>Hébergement</a:t>
+            </a:r>
+            <a:endParaRPr lang="fr-FR" b="1" dirty="0">
+              <a:latin typeface="Arial Narrow" pitchFamily="34" charset="0"/>
+              <a:ea typeface="Verdana" pitchFamily="34" charset="0"/>
+            </a:endParaRPr>
+          </a:p>
+        </p:txBody>
+      </p:sp>
+      <p:sp>
+        <p:nvSpPr>
+          <p:cNvPr id="8" name="ZoneTexte 7"/>
+          <p:cNvSpPr txBox="1"/>
+          <p:nvPr/>
+        </p:nvSpPr>
+        <p:spPr>
+          <a:xfrm>
+            <a:off x="4286248" y="2285992"/>
+            <a:ext cx="1571636" cy="369332"/>
+          </a:xfrm>
+          <a:prstGeom prst="rect">
+            <a:avLst/>
+          </a:prstGeom>
+          <a:noFill/>
+        </p:spPr>
+        <p:txBody>
+          <a:bodyPr wrap="square" rtlCol="0">
+            <a:spAutoFit/>
+          </a:bodyPr>
+          <a:lstStyle/>
+          <a:p>
+            <a:pPr algn="ctr"/>
+            <a:r>
+              <a:rPr lang="fr-FR" b="1" dirty="0" smtClean="0">
+                <a:latin typeface="Arial Narrow" pitchFamily="34" charset="0"/>
+                <a:ea typeface="Verdana" pitchFamily="34" charset="0"/>
+              </a:rPr>
+              <a:t>Back-end</a:t>
+            </a:r>
+            <a:endParaRPr lang="fr-FR" b="1" dirty="0">
+              <a:latin typeface="Arial Narrow" pitchFamily="34" charset="0"/>
+              <a:ea typeface="Verdana" pitchFamily="34" charset="0"/>
+            </a:endParaRPr>
+          </a:p>
+        </p:txBody>
+      </p:sp>
+      <p:grpSp>
+        <p:nvGrpSpPr>
+          <p:cNvPr id="15" name="Groupe 14"/>
+          <p:cNvGrpSpPr/>
+          <p:nvPr/>
+        </p:nvGrpSpPr>
+        <p:grpSpPr>
+          <a:xfrm>
+            <a:off x="-1714544" y="2500305"/>
+            <a:ext cx="1571636" cy="1857389"/>
+            <a:chOff x="-1571636" y="928670"/>
+            <a:chExt cx="1571636" cy="1857389"/>
+          </a:xfrm>
+          <a:noFill/>
+        </p:grpSpPr>
+        <p:grpSp>
+          <p:nvGrpSpPr>
+            <p:cNvPr id="13" name="Groupe 12"/>
+            <p:cNvGrpSpPr/>
+            <p:nvPr/>
+          </p:nvGrpSpPr>
+          <p:grpSpPr>
+            <a:xfrm>
+              <a:off x="-1143040" y="1428736"/>
+              <a:ext cx="642942" cy="1357323"/>
+              <a:chOff x="-1464511" y="2000240"/>
+              <a:chExt cx="964413" cy="2035983"/>
+            </a:xfrm>
+            <a:grpFill/>
+          </p:grpSpPr>
+          <p:sp>
+            <p:nvSpPr>
+              <p:cNvPr id="11" name="Organigramme : Délai 10"/>
+              <p:cNvSpPr/>
+              <p:nvPr/>
+            </p:nvSpPr>
+            <p:spPr>
+              <a:xfrm rot="16200000">
+                <a:off x="-1518089" y="3018231"/>
+                <a:ext cx="1071570" cy="964413"/>
+              </a:xfrm>
+              <a:prstGeom prst="flowChartDelay">
+                <a:avLst/>
+              </a:prstGeom>
+              <a:grpFill/>
+              <a:ln>
+                <a:solidFill>
+                  <a:schemeClr val="tx1"/>
+                </a:solidFill>
+              </a:ln>
+            </p:spPr>
+            <p:style>
+              <a:lnRef idx="2">
+                <a:schemeClr val="accent1">
+                  <a:shade val="50000"/>
+                </a:schemeClr>
+              </a:lnRef>
+              <a:fillRef idx="1">
+                <a:schemeClr val="accent1"/>
+              </a:fillRef>
+              <a:effectRef idx="0">
+                <a:schemeClr val="accent1"/>
+              </a:effectRef>
+              <a:fontRef idx="minor">
+                <a:schemeClr val="lt1"/>
+              </a:fontRef>
+            </p:style>
+            <p:txBody>
+              <a:bodyPr rtlCol="0" anchor="ctr"/>
+              <a:lstStyle/>
+              <a:p>
+                <a:pPr algn="ctr"/>
+                <a:endParaRPr lang="fr-FR">
+                  <a:latin typeface="Arial Narrow" pitchFamily="34" charset="0"/>
+                </a:endParaRPr>
+              </a:p>
+            </p:txBody>
+          </p:sp>
+          <p:sp>
+            <p:nvSpPr>
+              <p:cNvPr id="12" name="Ellipse 11"/>
+              <p:cNvSpPr/>
+              <p:nvPr/>
+            </p:nvSpPr>
+            <p:spPr>
+              <a:xfrm>
+                <a:off x="-1422000" y="2000240"/>
+                <a:ext cx="857256" cy="785818"/>
+              </a:xfrm>
+              <a:prstGeom prst="ellipse">
+                <a:avLst/>
+              </a:prstGeom>
+              <a:grpFill/>
+              <a:ln>
+                <a:solidFill>
+                  <a:schemeClr val="tx1"/>
+                </a:solidFill>
+              </a:ln>
+            </p:spPr>
+            <p:style>
+              <a:lnRef idx="2">
+                <a:schemeClr val="accent1">
+                  <a:shade val="50000"/>
+                </a:schemeClr>
+              </a:lnRef>
+              <a:fillRef idx="1">
+                <a:schemeClr val="accent1"/>
+              </a:fillRef>
+              <a:effectRef idx="0">
+                <a:schemeClr val="accent1"/>
+              </a:effectRef>
+              <a:fontRef idx="minor">
+                <a:schemeClr val="lt1"/>
+              </a:fontRef>
+            </p:style>
+            <p:txBody>
+              <a:bodyPr rtlCol="0" anchor="ctr"/>
+              <a:lstStyle/>
+              <a:p>
+                <a:pPr algn="ctr"/>
+                <a:endParaRPr lang="fr-FR">
+                  <a:latin typeface="Arial Narrow" pitchFamily="34" charset="0"/>
+                </a:endParaRPr>
+              </a:p>
+            </p:txBody>
+          </p:sp>
+        </p:grpSp>
+        <p:sp>
+          <p:nvSpPr>
+            <p:cNvPr id="14" name="ZoneTexte 13"/>
+            <p:cNvSpPr txBox="1"/>
+            <p:nvPr/>
+          </p:nvSpPr>
+          <p:spPr>
+            <a:xfrm>
+              <a:off x="-1571636" y="928670"/>
+              <a:ext cx="1571636" cy="369332"/>
+            </a:xfrm>
+            <a:prstGeom prst="rect">
+              <a:avLst/>
+            </a:prstGeom>
+            <a:grpFill/>
+          </p:spPr>
+          <p:txBody>
+            <a:bodyPr wrap="square" rtlCol="0">
+              <a:spAutoFit/>
+            </a:bodyPr>
+            <a:lstStyle/>
+            <a:p>
+              <a:pPr algn="ctr"/>
+              <a:r>
+                <a:rPr lang="fr-FR" b="1" dirty="0" smtClean="0">
+                  <a:latin typeface="Arial Narrow" pitchFamily="34" charset="0"/>
+                  <a:ea typeface="Verdana" pitchFamily="34" charset="0"/>
+                </a:rPr>
+                <a:t>Utilisateur</a:t>
+              </a:r>
+              <a:endParaRPr lang="fr-FR" b="1" dirty="0">
+                <a:latin typeface="Arial Narrow" pitchFamily="34" charset="0"/>
+                <a:ea typeface="Verdana" pitchFamily="34" charset="0"/>
+              </a:endParaRPr>
+            </a:p>
+          </p:txBody>
+        </p:sp>
+      </p:grpSp>
+      <p:sp>
+        <p:nvSpPr>
+          <p:cNvPr id="16" name="Rectangle 15"/>
+          <p:cNvSpPr/>
+          <p:nvPr/>
+        </p:nvSpPr>
+        <p:spPr>
+          <a:xfrm>
+            <a:off x="-1785982" y="5357826"/>
+            <a:ext cx="1562112" cy="2366978"/>
+          </a:xfrm>
+          <a:prstGeom prst="rect">
+            <a:avLst/>
+          </a:prstGeom>
+          <a:noFill/>
+          <a:ln w="3175">
+            <a:solidFill>
+              <a:schemeClr val="tx1"/>
+            </a:solidFill>
+          </a:ln>
+        </p:spPr>
+        <p:style>
+          <a:lnRef idx="2">
+            <a:schemeClr val="accent1">
+              <a:shade val="50000"/>
+            </a:schemeClr>
+          </a:lnRef>
+          <a:fillRef idx="1">
+            <a:schemeClr val="accent1"/>
+          </a:fillRef>
+          <a:effectRef idx="0">
+            <a:schemeClr val="accent1"/>
+          </a:effectRef>
+          <a:fontRef idx="minor">
+            <a:schemeClr val="lt1"/>
+          </a:fontRef>
+        </p:style>
+        <p:txBody>
+          <a:bodyPr rtlCol="0" anchor="ctr"/>
+          <a:lstStyle/>
+          <a:p>
+            <a:pPr algn="ctr"/>
+            <a:endParaRPr lang="fr-FR">
+              <a:latin typeface="Arial Narrow" pitchFamily="34" charset="0"/>
+            </a:endParaRPr>
+          </a:p>
+        </p:txBody>
+      </p:sp>
+      <p:sp>
+        <p:nvSpPr>
+          <p:cNvPr id="17" name="ZoneTexte 16"/>
+          <p:cNvSpPr txBox="1"/>
+          <p:nvPr/>
+        </p:nvSpPr>
+        <p:spPr>
+          <a:xfrm>
+            <a:off x="-1785982" y="5357826"/>
+            <a:ext cx="1571636" cy="1200329"/>
+          </a:xfrm>
+          <a:prstGeom prst="rect">
+            <a:avLst/>
+          </a:prstGeom>
+          <a:noFill/>
+        </p:spPr>
+        <p:txBody>
+          <a:bodyPr wrap="square" rtlCol="0">
+            <a:spAutoFit/>
+          </a:bodyPr>
+          <a:lstStyle/>
+          <a:p>
+            <a:pPr algn="ctr"/>
+            <a:r>
+              <a:rPr lang="fr-FR" b="1" dirty="0" smtClean="0">
+                <a:latin typeface="Arial Narrow" pitchFamily="34" charset="0"/>
+                <a:ea typeface="Verdana" pitchFamily="34" charset="0"/>
+              </a:rPr>
+              <a:t>Script </a:t>
+            </a:r>
+          </a:p>
+          <a:p>
+            <a:pPr algn="ctr"/>
+            <a:r>
+              <a:rPr lang="fr-FR" b="1" dirty="0" smtClean="0">
+                <a:latin typeface="Arial Narrow" pitchFamily="34" charset="0"/>
+                <a:ea typeface="Verdana" pitchFamily="34" charset="0"/>
+              </a:rPr>
+              <a:t>Enregistrement en base de données</a:t>
+            </a:r>
+            <a:endParaRPr lang="fr-FR" b="1" dirty="0">
+              <a:latin typeface="Arial Narrow" pitchFamily="34" charset="0"/>
+              <a:ea typeface="Verdana" pitchFamily="34" charset="0"/>
+            </a:endParaRPr>
+          </a:p>
+        </p:txBody>
+      </p:sp>
+      <p:sp>
+        <p:nvSpPr>
+          <p:cNvPr id="19" name="ZoneTexte 18"/>
+          <p:cNvSpPr txBox="1"/>
+          <p:nvPr/>
+        </p:nvSpPr>
+        <p:spPr>
+          <a:xfrm>
+            <a:off x="4214810" y="3000372"/>
+            <a:ext cx="1714512" cy="1477328"/>
+          </a:xfrm>
+          <a:prstGeom prst="rect">
+            <a:avLst/>
+          </a:prstGeom>
+          <a:noFill/>
+        </p:spPr>
+        <p:txBody>
+          <a:bodyPr wrap="square" rtlCol="0">
+            <a:spAutoFit/>
+          </a:bodyPr>
+          <a:lstStyle/>
+          <a:p>
+            <a:r>
+              <a:rPr lang="fr-FR" sz="1200" b="1" i="1" dirty="0" smtClean="0">
+                <a:latin typeface="Arial Narrow" pitchFamily="34" charset="0"/>
+                <a:ea typeface="Verdana" pitchFamily="34" charset="0"/>
+              </a:rPr>
+              <a:t>          </a:t>
+            </a:r>
+            <a:r>
+              <a:rPr lang="fr-FR" sz="1200" b="1" i="1" dirty="0" err="1" smtClean="0">
+                <a:latin typeface="Arial Narrow" pitchFamily="34" charset="0"/>
+                <a:ea typeface="Verdana" pitchFamily="34" charset="0"/>
+              </a:rPr>
+              <a:t>Flask</a:t>
+            </a:r>
+            <a:endParaRPr lang="fr-FR" sz="1200" b="1" i="1" dirty="0" smtClean="0">
+              <a:latin typeface="Arial Narrow" pitchFamily="34" charset="0"/>
+              <a:ea typeface="Verdana" pitchFamily="34" charset="0"/>
+            </a:endParaRPr>
+          </a:p>
+          <a:p>
+            <a:endParaRPr lang="fr-FR" b="1" i="1" dirty="0" smtClean="0">
+              <a:latin typeface="Arial Narrow" pitchFamily="34" charset="0"/>
+              <a:ea typeface="Verdana" pitchFamily="34" charset="0"/>
+            </a:endParaRPr>
+          </a:p>
+          <a:p>
+            <a:r>
+              <a:rPr lang="fr-FR" sz="1200" b="1" i="1" dirty="0" smtClean="0">
+                <a:latin typeface="Arial Narrow" pitchFamily="34" charset="0"/>
+                <a:ea typeface="Verdana" pitchFamily="34" charset="0"/>
+              </a:rPr>
+              <a:t>          </a:t>
+            </a:r>
+            <a:r>
+              <a:rPr lang="fr-FR" sz="1200" b="1" i="1" dirty="0" err="1" smtClean="0">
+                <a:latin typeface="Arial Narrow" pitchFamily="34" charset="0"/>
+                <a:ea typeface="Verdana" pitchFamily="34" charset="0"/>
+              </a:rPr>
+              <a:t>Flask_login</a:t>
+            </a:r>
+            <a:endParaRPr lang="fr-FR" sz="1200" b="1" i="1" dirty="0" smtClean="0">
+              <a:latin typeface="Arial Narrow" pitchFamily="34" charset="0"/>
+              <a:ea typeface="Verdana" pitchFamily="34" charset="0"/>
+            </a:endParaRPr>
+          </a:p>
+          <a:p>
+            <a:endParaRPr lang="fr-FR" b="1" i="1" dirty="0" smtClean="0">
+              <a:latin typeface="Arial Narrow" pitchFamily="34" charset="0"/>
+              <a:ea typeface="Verdana" pitchFamily="34" charset="0"/>
+            </a:endParaRPr>
+          </a:p>
+          <a:p>
+            <a:endParaRPr lang="fr-FR" b="1" i="1" dirty="0" smtClean="0">
+              <a:latin typeface="Arial Narrow" pitchFamily="34" charset="0"/>
+              <a:ea typeface="Verdana" pitchFamily="34" charset="0"/>
+            </a:endParaRPr>
+          </a:p>
+          <a:p>
+            <a:pPr algn="ctr"/>
+            <a:r>
+              <a:rPr lang="fr-FR" sz="1200" b="1" i="1" dirty="0" err="1" smtClean="0">
+                <a:latin typeface="Arial Narrow" pitchFamily="34" charset="0"/>
+                <a:ea typeface="Verdana" pitchFamily="34" charset="0"/>
+              </a:rPr>
+              <a:t>Flask_sqlalchemy</a:t>
+            </a:r>
+            <a:endParaRPr lang="fr-FR" sz="1200" b="1" i="1" dirty="0">
+              <a:latin typeface="Arial Narrow" pitchFamily="34" charset="0"/>
+              <a:ea typeface="Verdana" pitchFamily="34" charset="0"/>
+            </a:endParaRPr>
+          </a:p>
+        </p:txBody>
+      </p:sp>
+      <p:sp>
+        <p:nvSpPr>
+          <p:cNvPr id="24" name="ZoneTexte 23"/>
+          <p:cNvSpPr txBox="1"/>
+          <p:nvPr/>
+        </p:nvSpPr>
+        <p:spPr>
+          <a:xfrm>
+            <a:off x="4143372" y="1357298"/>
+            <a:ext cx="1571636" cy="276999"/>
+          </a:xfrm>
+          <a:prstGeom prst="rect">
+            <a:avLst/>
+          </a:prstGeom>
+          <a:noFill/>
+        </p:spPr>
+        <p:txBody>
+          <a:bodyPr wrap="square" rtlCol="0">
+            <a:spAutoFit/>
+          </a:bodyPr>
+          <a:lstStyle/>
+          <a:p>
+            <a:r>
+              <a:rPr lang="fr-FR" sz="1200" b="1" i="1" dirty="0" smtClean="0">
+                <a:latin typeface="Arial Narrow" pitchFamily="34" charset="0"/>
+                <a:ea typeface="Verdana" pitchFamily="34" charset="0"/>
+              </a:rPr>
+              <a:t>      Azure</a:t>
+            </a:r>
+            <a:endParaRPr lang="fr-FR" sz="1600" b="1" i="1" dirty="0">
+              <a:latin typeface="Arial Narrow" pitchFamily="34" charset="0"/>
+              <a:ea typeface="Verdana" pitchFamily="34" charset="0"/>
+            </a:endParaRPr>
+          </a:p>
+        </p:txBody>
+      </p:sp>
+      <p:pic>
+        <p:nvPicPr>
+          <p:cNvPr id="25" name="Picture 2" descr="Fichier:Microsoft-Azure.png — Wikipédia"/>
+          <p:cNvPicPr>
+            <a:picLocks noChangeAspect="1" noChangeArrowheads="1"/>
+          </p:cNvPicPr>
+          <p:nvPr/>
+        </p:nvPicPr>
+        <p:blipFill>
+          <a:blip r:embed="rId3" cstate="print"/>
+          <a:srcRect/>
+          <a:stretch>
+            <a:fillRect/>
+          </a:stretch>
+        </p:blipFill>
+        <p:spPr bwMode="auto">
+          <a:xfrm>
+            <a:off x="4071934" y="1214422"/>
+            <a:ext cx="428628" cy="428628"/>
+          </a:xfrm>
+          <a:prstGeom prst="rect">
+            <a:avLst/>
+          </a:prstGeom>
+          <a:noFill/>
+        </p:spPr>
+      </p:pic>
+      <p:pic>
+        <p:nvPicPr>
+          <p:cNvPr id="26" name="Picture 4" descr="Formation Flask – Ambient IT"/>
+          <p:cNvPicPr>
+            <a:picLocks noChangeAspect="1" noChangeArrowheads="1"/>
+          </p:cNvPicPr>
+          <p:nvPr/>
+        </p:nvPicPr>
+        <p:blipFill>
+          <a:blip r:embed="rId4" cstate="print"/>
+          <a:srcRect/>
+          <a:stretch>
+            <a:fillRect/>
+          </a:stretch>
+        </p:blipFill>
+        <p:spPr bwMode="auto">
+          <a:xfrm>
+            <a:off x="4378097" y="2928934"/>
+            <a:ext cx="408217" cy="357190"/>
+          </a:xfrm>
+          <a:prstGeom prst="rect">
+            <a:avLst/>
+          </a:prstGeom>
+          <a:noFill/>
+        </p:spPr>
+      </p:pic>
+      <p:pic>
+        <p:nvPicPr>
+          <p:cNvPr id="27" name="Picture 6" descr="Fichier:Python-logo-notext.svg — Wikipédia"/>
+          <p:cNvPicPr>
+            <a:picLocks noChangeAspect="1" noChangeArrowheads="1"/>
+          </p:cNvPicPr>
+          <p:nvPr/>
+        </p:nvPicPr>
+        <p:blipFill>
+          <a:blip r:embed="rId5" cstate="print"/>
+          <a:srcRect b="8824"/>
+          <a:stretch>
+            <a:fillRect/>
+          </a:stretch>
+        </p:blipFill>
+        <p:spPr bwMode="auto">
+          <a:xfrm>
+            <a:off x="-1714609" y="6764561"/>
+            <a:ext cx="357255" cy="356929"/>
+          </a:xfrm>
+          <a:prstGeom prst="rect">
+            <a:avLst/>
+          </a:prstGeom>
+          <a:noFill/>
+        </p:spPr>
+      </p:pic>
+      <p:grpSp>
+        <p:nvGrpSpPr>
+          <p:cNvPr id="67" name="Groupe 66"/>
+          <p:cNvGrpSpPr/>
+          <p:nvPr/>
+        </p:nvGrpSpPr>
+        <p:grpSpPr>
+          <a:xfrm>
+            <a:off x="1571604" y="2285992"/>
+            <a:ext cx="1571636" cy="2366978"/>
+            <a:chOff x="1643042" y="2285992"/>
+            <a:chExt cx="1571636" cy="2366978"/>
+          </a:xfrm>
+        </p:grpSpPr>
+        <p:sp>
+          <p:nvSpPr>
+            <p:cNvPr id="4" name="Rectangle 3"/>
+            <p:cNvSpPr/>
+            <p:nvPr/>
+          </p:nvSpPr>
+          <p:spPr>
+            <a:xfrm>
+              <a:off x="1643042" y="2285992"/>
+              <a:ext cx="1562112" cy="2366978"/>
+            </a:xfrm>
+            <a:prstGeom prst="rect">
+              <a:avLst/>
+            </a:prstGeom>
+            <a:noFill/>
+            <a:ln w="3175">
+              <a:solidFill>
+                <a:schemeClr val="tx1"/>
+              </a:solidFill>
+            </a:ln>
+          </p:spPr>
+          <p:style>
+            <a:lnRef idx="2">
+              <a:schemeClr val="accent1">
+                <a:shade val="50000"/>
+              </a:schemeClr>
+            </a:lnRef>
+            <a:fillRef idx="1">
+              <a:schemeClr val="accent1"/>
+            </a:fillRef>
+            <a:effectRef idx="0">
+              <a:schemeClr val="accent1"/>
+            </a:effectRef>
+            <a:fontRef idx="minor">
+              <a:schemeClr val="lt1"/>
+            </a:fontRef>
+          </p:style>
+          <p:txBody>
+            <a:bodyPr rtlCol="0" anchor="ctr"/>
+            <a:lstStyle/>
+            <a:p>
+              <a:pPr algn="ctr"/>
+              <a:endParaRPr lang="fr-FR">
+                <a:latin typeface="Arial Narrow" pitchFamily="34" charset="0"/>
+              </a:endParaRPr>
+            </a:p>
+          </p:txBody>
+        </p:sp>
+        <p:sp>
+          <p:nvSpPr>
+            <p:cNvPr id="7" name="ZoneTexte 6"/>
+            <p:cNvSpPr txBox="1"/>
+            <p:nvPr/>
+          </p:nvSpPr>
+          <p:spPr>
+            <a:xfrm>
+              <a:off x="1643042" y="2285992"/>
+              <a:ext cx="1571636" cy="369332"/>
+            </a:xfrm>
+            <a:prstGeom prst="rect">
+              <a:avLst/>
+            </a:prstGeom>
+            <a:noFill/>
+          </p:spPr>
+          <p:txBody>
+            <a:bodyPr wrap="square" rtlCol="0">
+              <a:spAutoFit/>
+            </a:bodyPr>
+            <a:lstStyle/>
+            <a:p>
+              <a:pPr algn="ctr"/>
+              <a:r>
+                <a:rPr lang="fr-FR" b="1" dirty="0" smtClean="0">
+                  <a:latin typeface="Arial Narrow" pitchFamily="34" charset="0"/>
+                  <a:ea typeface="Verdana" pitchFamily="34" charset="0"/>
+                </a:rPr>
+                <a:t>Front-end</a:t>
+              </a:r>
+              <a:endParaRPr lang="fr-FR" b="1" dirty="0">
+                <a:latin typeface="Arial Narrow" pitchFamily="34" charset="0"/>
+                <a:ea typeface="Verdana" pitchFamily="34" charset="0"/>
+              </a:endParaRPr>
+            </a:p>
+          </p:txBody>
+        </p:sp>
+        <p:sp>
+          <p:nvSpPr>
+            <p:cNvPr id="18" name="ZoneTexte 17"/>
+            <p:cNvSpPr txBox="1"/>
+            <p:nvPr/>
+          </p:nvSpPr>
+          <p:spPr>
+            <a:xfrm>
+              <a:off x="1643042" y="3000372"/>
+              <a:ext cx="1571636" cy="1200329"/>
+            </a:xfrm>
+            <a:prstGeom prst="rect">
+              <a:avLst/>
+            </a:prstGeom>
+            <a:noFill/>
+          </p:spPr>
+          <p:txBody>
+            <a:bodyPr wrap="square" rtlCol="0">
+              <a:spAutoFit/>
+            </a:bodyPr>
+            <a:lstStyle/>
+            <a:p>
+              <a:r>
+                <a:rPr lang="fr-FR" sz="1200" b="1" i="1" dirty="0" smtClean="0">
+                  <a:latin typeface="Arial Narrow" pitchFamily="34" charset="0"/>
+                  <a:ea typeface="Verdana" pitchFamily="34" charset="0"/>
+                </a:rPr>
+                <a:t> </a:t>
+              </a:r>
+              <a:r>
+                <a:rPr lang="fr-FR" sz="1200" b="1" i="1" dirty="0" smtClean="0">
+                  <a:latin typeface="Arial Narrow" pitchFamily="34" charset="0"/>
+                  <a:ea typeface="Verdana" pitchFamily="34" charset="0"/>
+                </a:rPr>
+                <a:t>         HTML</a:t>
+              </a:r>
+            </a:p>
+            <a:p>
+              <a:endParaRPr lang="fr-FR" b="1" i="1" dirty="0" smtClean="0">
+                <a:latin typeface="Arial Narrow" pitchFamily="34" charset="0"/>
+                <a:ea typeface="Verdana" pitchFamily="34" charset="0"/>
+              </a:endParaRPr>
+            </a:p>
+            <a:p>
+              <a:r>
+                <a:rPr lang="fr-FR" sz="1200" b="1" i="1" dirty="0" smtClean="0">
+                  <a:latin typeface="Arial Narrow" pitchFamily="34" charset="0"/>
+                  <a:ea typeface="Verdana" pitchFamily="34" charset="0"/>
+                </a:rPr>
+                <a:t>          CSS</a:t>
+              </a:r>
+            </a:p>
+            <a:p>
+              <a:endParaRPr lang="fr-FR" b="1" i="1" dirty="0" smtClean="0">
+                <a:latin typeface="Arial Narrow" pitchFamily="34" charset="0"/>
+                <a:ea typeface="Verdana" pitchFamily="34" charset="0"/>
+              </a:endParaRPr>
+            </a:p>
+            <a:p>
+              <a:r>
+                <a:rPr lang="fr-FR" sz="1200" b="1" i="1" dirty="0" smtClean="0">
+                  <a:latin typeface="Arial Narrow" pitchFamily="34" charset="0"/>
+                  <a:ea typeface="Verdana" pitchFamily="34" charset="0"/>
+                </a:rPr>
+                <a:t>          </a:t>
+              </a:r>
+              <a:r>
+                <a:rPr lang="fr-FR" sz="1200" b="1" i="1" dirty="0" err="1" smtClean="0">
+                  <a:latin typeface="Arial Narrow" pitchFamily="34" charset="0"/>
+                  <a:ea typeface="Verdana" pitchFamily="34" charset="0"/>
+                </a:rPr>
+                <a:t>Boostrap</a:t>
+              </a:r>
+              <a:endParaRPr lang="fr-FR" sz="1600" b="1" i="1" dirty="0">
+                <a:latin typeface="Arial Narrow" pitchFamily="34" charset="0"/>
+                <a:ea typeface="Verdana" pitchFamily="34" charset="0"/>
+              </a:endParaRPr>
+            </a:p>
+          </p:txBody>
+        </p:sp>
+        <p:pic>
+          <p:nvPicPr>
+            <p:cNvPr id="28" name="Picture 10" descr="File:Bootstrap logo.svg - Wikimedia Commons"/>
+            <p:cNvPicPr>
+              <a:picLocks noChangeAspect="1" noChangeArrowheads="1"/>
+            </p:cNvPicPr>
+            <p:nvPr/>
+          </p:nvPicPr>
+          <p:blipFill>
+            <a:blip r:embed="rId6" cstate="print"/>
+            <a:srcRect/>
+            <a:stretch>
+              <a:fillRect/>
+            </a:stretch>
+          </p:blipFill>
+          <p:spPr bwMode="auto">
+            <a:xfrm>
+              <a:off x="1694872" y="3857630"/>
+              <a:ext cx="376798" cy="300262"/>
+            </a:xfrm>
+            <a:prstGeom prst="rect">
+              <a:avLst/>
+            </a:prstGeom>
+            <a:noFill/>
+          </p:spPr>
+        </p:pic>
+        <p:pic>
+          <p:nvPicPr>
+            <p:cNvPr id="29" name="Picture 12" descr="Un Logo en CSS3 sans images - Les Carnets de Byfeel"/>
+            <p:cNvPicPr>
+              <a:picLocks noChangeAspect="1" noChangeArrowheads="1"/>
+            </p:cNvPicPr>
+            <p:nvPr/>
+          </p:nvPicPr>
+          <p:blipFill>
+            <a:blip r:embed="rId7" cstate="print"/>
+            <a:srcRect r="53125"/>
+            <a:stretch>
+              <a:fillRect/>
+            </a:stretch>
+          </p:blipFill>
+          <p:spPr bwMode="auto">
+            <a:xfrm>
+              <a:off x="1714480" y="3357562"/>
+              <a:ext cx="310303" cy="428628"/>
+            </a:xfrm>
+            <a:prstGeom prst="rect">
+              <a:avLst/>
+            </a:prstGeom>
+            <a:noFill/>
+          </p:spPr>
+        </p:pic>
+        <p:pic>
+          <p:nvPicPr>
+            <p:cNvPr id="30" name="Picture 12" descr="Un Logo en CSS3 sans images - Les Carnets de Byfeel"/>
+            <p:cNvPicPr>
+              <a:picLocks noChangeAspect="1" noChangeArrowheads="1"/>
+            </p:cNvPicPr>
+            <p:nvPr/>
+          </p:nvPicPr>
+          <p:blipFill>
+            <a:blip r:embed="rId7" cstate="print"/>
+            <a:srcRect l="54375"/>
+            <a:stretch>
+              <a:fillRect/>
+            </a:stretch>
+          </p:blipFill>
+          <p:spPr bwMode="auto">
+            <a:xfrm>
+              <a:off x="1714480" y="2857496"/>
+              <a:ext cx="302023" cy="428628"/>
+            </a:xfrm>
+            <a:prstGeom prst="rect">
+              <a:avLst/>
+            </a:prstGeom>
+            <a:noFill/>
+          </p:spPr>
+        </p:pic>
+      </p:grpSp>
+      <p:sp>
+        <p:nvSpPr>
+          <p:cNvPr id="37" name="Cylindre 36"/>
+          <p:cNvSpPr/>
+          <p:nvPr/>
+        </p:nvSpPr>
+        <p:spPr>
+          <a:xfrm>
+            <a:off x="-4143436" y="5286388"/>
+            <a:ext cx="1571636" cy="2428892"/>
+          </a:xfrm>
+          <a:prstGeom prst="can">
+            <a:avLst/>
+          </a:prstGeom>
+          <a:noFill/>
+          <a:ln w="3175">
+            <a:solidFill>
+              <a:schemeClr val="tx1"/>
+            </a:solidFill>
+          </a:ln>
+        </p:spPr>
+        <p:style>
+          <a:lnRef idx="2">
+            <a:schemeClr val="accent1">
+              <a:shade val="50000"/>
+            </a:schemeClr>
+          </a:lnRef>
+          <a:fillRef idx="1">
+            <a:schemeClr val="accent1"/>
+          </a:fillRef>
+          <a:effectRef idx="0">
+            <a:schemeClr val="accent1"/>
+          </a:effectRef>
+          <a:fontRef idx="minor">
+            <a:schemeClr val="lt1"/>
+          </a:fontRef>
+        </p:style>
+        <p:txBody>
+          <a:bodyPr rtlCol="0" anchor="ctr"/>
+          <a:lstStyle/>
+          <a:p>
+            <a:pPr algn="ctr"/>
+            <a:endParaRPr lang="fr-FR">
+              <a:latin typeface="Arial Narrow" pitchFamily="34" charset="0"/>
+            </a:endParaRPr>
+          </a:p>
+        </p:txBody>
+      </p:sp>
+      <p:sp>
+        <p:nvSpPr>
+          <p:cNvPr id="38" name="ZoneTexte 37"/>
+          <p:cNvSpPr txBox="1"/>
+          <p:nvPr/>
+        </p:nvSpPr>
+        <p:spPr>
+          <a:xfrm>
+            <a:off x="-4143436" y="5715016"/>
+            <a:ext cx="1571636" cy="646331"/>
+          </a:xfrm>
+          <a:prstGeom prst="rect">
+            <a:avLst/>
+          </a:prstGeom>
+          <a:noFill/>
+        </p:spPr>
+        <p:txBody>
+          <a:bodyPr wrap="square" rtlCol="0">
+            <a:spAutoFit/>
+          </a:bodyPr>
+          <a:lstStyle/>
+          <a:p>
+            <a:pPr algn="ctr"/>
+            <a:r>
+              <a:rPr lang="fr-FR" b="1" dirty="0" smtClean="0">
+                <a:latin typeface="Arial Narrow" pitchFamily="34" charset="0"/>
+                <a:ea typeface="Verdana" pitchFamily="34" charset="0"/>
+              </a:rPr>
+              <a:t>Base de données</a:t>
+            </a:r>
+            <a:endParaRPr lang="fr-FR" b="1" dirty="0">
+              <a:latin typeface="Arial Narrow" pitchFamily="34" charset="0"/>
+              <a:ea typeface="Verdana" pitchFamily="34" charset="0"/>
+            </a:endParaRPr>
+          </a:p>
+        </p:txBody>
+      </p:sp>
+      <p:pic>
+        <p:nvPicPr>
+          <p:cNvPr id="39" name="Picture 22" descr="MySQL — Wikipédia"/>
+          <p:cNvPicPr>
+            <a:picLocks noChangeAspect="1" noChangeArrowheads="1"/>
+          </p:cNvPicPr>
+          <p:nvPr/>
+        </p:nvPicPr>
+        <p:blipFill>
+          <a:blip r:embed="rId8" cstate="print"/>
+          <a:srcRect/>
+          <a:stretch>
+            <a:fillRect/>
+          </a:stretch>
+        </p:blipFill>
+        <p:spPr bwMode="auto">
+          <a:xfrm>
+            <a:off x="-3929122" y="6838021"/>
+            <a:ext cx="1143008" cy="591507"/>
+          </a:xfrm>
+          <a:prstGeom prst="rect">
+            <a:avLst/>
+          </a:prstGeom>
+          <a:noFill/>
+        </p:spPr>
+      </p:pic>
+      <p:sp>
+        <p:nvSpPr>
+          <p:cNvPr id="40" name="ZoneTexte 39"/>
+          <p:cNvSpPr txBox="1"/>
+          <p:nvPr/>
+        </p:nvSpPr>
+        <p:spPr>
+          <a:xfrm>
+            <a:off x="-4143436" y="6550223"/>
+            <a:ext cx="1571636" cy="307777"/>
+          </a:xfrm>
+          <a:prstGeom prst="rect">
+            <a:avLst/>
+          </a:prstGeom>
+          <a:noFill/>
+        </p:spPr>
+        <p:txBody>
+          <a:bodyPr wrap="square" rtlCol="0">
+            <a:spAutoFit/>
+          </a:bodyPr>
+          <a:lstStyle/>
+          <a:p>
+            <a:pPr algn="ctr"/>
+            <a:r>
+              <a:rPr lang="fr-FR" sz="1400" b="1" i="1" dirty="0" smtClean="0">
+                <a:latin typeface="Arial Narrow" pitchFamily="34" charset="0"/>
+                <a:ea typeface="Verdana" pitchFamily="34" charset="0"/>
+              </a:rPr>
+              <a:t>MySQL</a:t>
+            </a:r>
+          </a:p>
+        </p:txBody>
+      </p:sp>
+      <p:sp>
+        <p:nvSpPr>
+          <p:cNvPr id="41" name="Rectangle 40"/>
+          <p:cNvSpPr/>
+          <p:nvPr/>
+        </p:nvSpPr>
+        <p:spPr>
+          <a:xfrm>
+            <a:off x="-1785982" y="6835999"/>
+            <a:ext cx="1571636" cy="307777"/>
+          </a:xfrm>
+          <a:prstGeom prst="rect">
+            <a:avLst/>
+          </a:prstGeom>
+        </p:spPr>
+        <p:txBody>
+          <a:bodyPr wrap="square">
+            <a:spAutoFit/>
+          </a:bodyPr>
+          <a:lstStyle/>
+          <a:p>
+            <a:r>
+              <a:rPr lang="fr-FR" sz="1400" b="1" i="1" dirty="0" smtClean="0">
+                <a:latin typeface="Arial Narrow" pitchFamily="34" charset="0"/>
+                <a:ea typeface="Verdana" pitchFamily="34" charset="0"/>
+              </a:rPr>
+              <a:t> </a:t>
+            </a:r>
+            <a:r>
+              <a:rPr lang="fr-FR" sz="1400" b="1" i="1" dirty="0" smtClean="0">
+                <a:latin typeface="Arial Narrow" pitchFamily="34" charset="0"/>
+                <a:ea typeface="Verdana" pitchFamily="34" charset="0"/>
+              </a:rPr>
+              <a:t>         Python</a:t>
+            </a:r>
+            <a:endParaRPr lang="fr-FR" sz="1400" dirty="0">
+              <a:latin typeface="Arial Narrow" pitchFamily="34" charset="0"/>
+            </a:endParaRPr>
+          </a:p>
+        </p:txBody>
+      </p:sp>
+      <p:pic>
+        <p:nvPicPr>
+          <p:cNvPr id="42" name="Picture 8" descr="Flask-SQLAlchemy — Flask-SQLAlchemy Documentation (3.0.x)"/>
+          <p:cNvPicPr>
+            <a:picLocks noChangeAspect="1" noChangeArrowheads="1"/>
+          </p:cNvPicPr>
+          <p:nvPr/>
+        </p:nvPicPr>
+        <p:blipFill>
+          <a:blip r:embed="rId9"/>
+          <a:srcRect/>
+          <a:stretch>
+            <a:fillRect/>
+          </a:stretch>
+        </p:blipFill>
+        <p:spPr bwMode="auto">
+          <a:xfrm>
+            <a:off x="4357686" y="3929066"/>
+            <a:ext cx="1428760" cy="325624"/>
+          </a:xfrm>
+          <a:prstGeom prst="rect">
+            <a:avLst/>
+          </a:prstGeom>
+          <a:noFill/>
+        </p:spPr>
+      </p:pic>
+      <p:sp>
+        <p:nvSpPr>
+          <p:cNvPr id="22" name="Cylindre 21"/>
+          <p:cNvSpPr/>
+          <p:nvPr/>
+        </p:nvSpPr>
+        <p:spPr>
+          <a:xfrm>
+            <a:off x="6643702" y="3571876"/>
+            <a:ext cx="1571636" cy="2428892"/>
+          </a:xfrm>
+          <a:prstGeom prst="can">
+            <a:avLst/>
+          </a:prstGeom>
+          <a:noFill/>
+          <a:ln w="3175">
+            <a:solidFill>
+              <a:schemeClr val="tx1"/>
+            </a:solidFill>
+          </a:ln>
+        </p:spPr>
+        <p:style>
+          <a:lnRef idx="2">
+            <a:schemeClr val="accent1">
+              <a:shade val="50000"/>
+            </a:schemeClr>
+          </a:lnRef>
+          <a:fillRef idx="1">
+            <a:schemeClr val="accent1"/>
+          </a:fillRef>
+          <a:effectRef idx="0">
+            <a:schemeClr val="accent1"/>
+          </a:effectRef>
+          <a:fontRef idx="minor">
+            <a:schemeClr val="lt1"/>
+          </a:fontRef>
+        </p:style>
+        <p:txBody>
+          <a:bodyPr rtlCol="0" anchor="ctr"/>
+          <a:lstStyle/>
+          <a:p>
+            <a:pPr algn="ctr"/>
+            <a:endParaRPr lang="fr-FR">
+              <a:latin typeface="Arial Narrow" pitchFamily="34" charset="0"/>
+            </a:endParaRPr>
+          </a:p>
+        </p:txBody>
+      </p:sp>
+      <p:sp>
+        <p:nvSpPr>
+          <p:cNvPr id="23" name="ZoneTexte 22"/>
+          <p:cNvSpPr txBox="1"/>
+          <p:nvPr/>
+        </p:nvSpPr>
+        <p:spPr>
+          <a:xfrm>
+            <a:off x="6643702" y="4000504"/>
+            <a:ext cx="1571636" cy="923330"/>
+          </a:xfrm>
+          <a:prstGeom prst="rect">
+            <a:avLst/>
+          </a:prstGeom>
+          <a:noFill/>
+        </p:spPr>
+        <p:txBody>
+          <a:bodyPr wrap="square" rtlCol="0">
+            <a:spAutoFit/>
+          </a:bodyPr>
+          <a:lstStyle/>
+          <a:p>
+            <a:pPr algn="ctr"/>
+            <a:r>
+              <a:rPr lang="fr-FR" b="1" dirty="0" smtClean="0">
+                <a:latin typeface="Arial Narrow" pitchFamily="34" charset="0"/>
+                <a:ea typeface="Verdana" pitchFamily="34" charset="0"/>
+              </a:rPr>
+              <a:t>Base de données</a:t>
+            </a:r>
+          </a:p>
+          <a:p>
+            <a:pPr algn="ctr"/>
+            <a:r>
+              <a:rPr lang="fr-FR" b="1" dirty="0" smtClean="0">
+                <a:latin typeface="Arial Narrow" pitchFamily="34" charset="0"/>
+                <a:ea typeface="Verdana" pitchFamily="34" charset="0"/>
+              </a:rPr>
+              <a:t>Prédictions</a:t>
+            </a:r>
+            <a:endParaRPr lang="fr-FR" b="1" dirty="0">
+              <a:latin typeface="Arial Narrow" pitchFamily="34" charset="0"/>
+              <a:ea typeface="Verdana" pitchFamily="34" charset="0"/>
+            </a:endParaRPr>
+          </a:p>
+        </p:txBody>
+      </p:sp>
+      <p:pic>
+        <p:nvPicPr>
+          <p:cNvPr id="43" name="Picture 14" descr="File:Sqlite-square-icon.svg - Wikimedia Commons"/>
+          <p:cNvPicPr>
+            <a:picLocks noChangeAspect="1" noChangeArrowheads="1"/>
+          </p:cNvPicPr>
+          <p:nvPr/>
+        </p:nvPicPr>
+        <p:blipFill>
+          <a:blip r:embed="rId10" cstate="print"/>
+          <a:srcRect/>
+          <a:stretch>
+            <a:fillRect/>
+          </a:stretch>
+        </p:blipFill>
+        <p:spPr bwMode="auto">
+          <a:xfrm>
+            <a:off x="6786578" y="5000636"/>
+            <a:ext cx="357190" cy="357190"/>
+          </a:xfrm>
+          <a:prstGeom prst="rect">
+            <a:avLst/>
+          </a:prstGeom>
+          <a:noFill/>
+        </p:spPr>
+      </p:pic>
+      <p:sp>
+        <p:nvSpPr>
+          <p:cNvPr id="44" name="ZoneTexte 43"/>
+          <p:cNvSpPr txBox="1"/>
+          <p:nvPr/>
+        </p:nvSpPr>
+        <p:spPr>
+          <a:xfrm>
+            <a:off x="6643702" y="5072074"/>
+            <a:ext cx="1571636" cy="276999"/>
+          </a:xfrm>
+          <a:prstGeom prst="rect">
+            <a:avLst/>
+          </a:prstGeom>
+          <a:noFill/>
+        </p:spPr>
+        <p:txBody>
+          <a:bodyPr wrap="square" rtlCol="0">
+            <a:spAutoFit/>
+          </a:bodyPr>
+          <a:lstStyle/>
+          <a:p>
+            <a:r>
+              <a:rPr lang="fr-FR" sz="1200" b="1" i="1" dirty="0" smtClean="0">
+                <a:latin typeface="Arial Narrow" pitchFamily="34" charset="0"/>
+                <a:ea typeface="Verdana" pitchFamily="34" charset="0"/>
+              </a:rPr>
+              <a:t>          </a:t>
+            </a:r>
+            <a:r>
+              <a:rPr lang="fr-FR" sz="1200" b="1" i="1" dirty="0" err="1" smtClean="0">
+                <a:latin typeface="Arial Narrow" pitchFamily="34" charset="0"/>
+                <a:ea typeface="Verdana" pitchFamily="34" charset="0"/>
+              </a:rPr>
+              <a:t>SQLite</a:t>
+            </a:r>
+            <a:endParaRPr lang="fr-FR" sz="1200" b="1" i="1" dirty="0" smtClean="0">
+              <a:latin typeface="Arial Narrow" pitchFamily="34" charset="0"/>
+              <a:ea typeface="Verdana" pitchFamily="34" charset="0"/>
+            </a:endParaRPr>
+          </a:p>
+        </p:txBody>
+      </p:sp>
+      <p:sp>
+        <p:nvSpPr>
+          <p:cNvPr id="50" name="Cylindre 49"/>
+          <p:cNvSpPr/>
+          <p:nvPr/>
+        </p:nvSpPr>
+        <p:spPr>
+          <a:xfrm>
+            <a:off x="6643702" y="928670"/>
+            <a:ext cx="1571636" cy="2428892"/>
+          </a:xfrm>
+          <a:prstGeom prst="can">
+            <a:avLst/>
+          </a:prstGeom>
+          <a:noFill/>
+          <a:ln w="3175">
+            <a:solidFill>
+              <a:schemeClr val="tx1"/>
+            </a:solidFill>
+          </a:ln>
+        </p:spPr>
+        <p:style>
+          <a:lnRef idx="2">
+            <a:schemeClr val="accent1">
+              <a:shade val="50000"/>
+            </a:schemeClr>
+          </a:lnRef>
+          <a:fillRef idx="1">
+            <a:schemeClr val="accent1"/>
+          </a:fillRef>
+          <a:effectRef idx="0">
+            <a:schemeClr val="accent1"/>
+          </a:effectRef>
+          <a:fontRef idx="minor">
+            <a:schemeClr val="lt1"/>
+          </a:fontRef>
+        </p:style>
+        <p:txBody>
+          <a:bodyPr rtlCol="0" anchor="ctr"/>
+          <a:lstStyle/>
+          <a:p>
+            <a:pPr algn="ctr"/>
+            <a:endParaRPr lang="fr-FR">
+              <a:latin typeface="Arial Narrow" pitchFamily="34" charset="0"/>
+            </a:endParaRPr>
+          </a:p>
+        </p:txBody>
+      </p:sp>
+      <p:sp>
+        <p:nvSpPr>
+          <p:cNvPr id="51" name="ZoneTexte 50"/>
+          <p:cNvSpPr txBox="1"/>
+          <p:nvPr/>
+        </p:nvSpPr>
+        <p:spPr>
+          <a:xfrm>
+            <a:off x="6643702" y="1357298"/>
+            <a:ext cx="1571636" cy="923330"/>
+          </a:xfrm>
+          <a:prstGeom prst="rect">
+            <a:avLst/>
+          </a:prstGeom>
+          <a:noFill/>
+        </p:spPr>
+        <p:txBody>
+          <a:bodyPr wrap="square" rtlCol="0">
+            <a:spAutoFit/>
+          </a:bodyPr>
+          <a:lstStyle/>
+          <a:p>
+            <a:pPr algn="ctr"/>
+            <a:r>
+              <a:rPr lang="fr-FR" b="1" dirty="0" smtClean="0">
+                <a:latin typeface="Arial Narrow" pitchFamily="34" charset="0"/>
+                <a:ea typeface="Verdana" pitchFamily="34" charset="0"/>
+              </a:rPr>
+              <a:t>Base de données</a:t>
+            </a:r>
+          </a:p>
+          <a:p>
+            <a:pPr algn="ctr"/>
+            <a:r>
+              <a:rPr lang="fr-FR" b="1" dirty="0" smtClean="0">
+                <a:latin typeface="Arial Narrow" pitchFamily="34" charset="0"/>
+                <a:ea typeface="Verdana" pitchFamily="34" charset="0"/>
+              </a:rPr>
+              <a:t>Utilisateurs</a:t>
+            </a:r>
+            <a:endParaRPr lang="fr-FR" b="1" dirty="0">
+              <a:latin typeface="Arial Narrow" pitchFamily="34" charset="0"/>
+              <a:ea typeface="Verdana" pitchFamily="34" charset="0"/>
+            </a:endParaRPr>
+          </a:p>
+        </p:txBody>
+      </p:sp>
+      <p:pic>
+        <p:nvPicPr>
+          <p:cNvPr id="48" name="Picture 14" descr="File:Sqlite-square-icon.svg - Wikimedia Commons"/>
+          <p:cNvPicPr>
+            <a:picLocks noChangeAspect="1" noChangeArrowheads="1"/>
+          </p:cNvPicPr>
+          <p:nvPr/>
+        </p:nvPicPr>
+        <p:blipFill>
+          <a:blip r:embed="rId10" cstate="print"/>
+          <a:srcRect/>
+          <a:stretch>
+            <a:fillRect/>
+          </a:stretch>
+        </p:blipFill>
+        <p:spPr bwMode="auto">
+          <a:xfrm>
+            <a:off x="6786578" y="2357430"/>
+            <a:ext cx="357190" cy="357190"/>
+          </a:xfrm>
+          <a:prstGeom prst="rect">
+            <a:avLst/>
+          </a:prstGeom>
+          <a:noFill/>
+        </p:spPr>
+      </p:pic>
+      <p:sp>
+        <p:nvSpPr>
+          <p:cNvPr id="49" name="ZoneTexte 48"/>
+          <p:cNvSpPr txBox="1"/>
+          <p:nvPr/>
+        </p:nvSpPr>
+        <p:spPr>
+          <a:xfrm>
+            <a:off x="6643702" y="2428868"/>
+            <a:ext cx="1571636" cy="276999"/>
+          </a:xfrm>
+          <a:prstGeom prst="rect">
+            <a:avLst/>
+          </a:prstGeom>
+          <a:noFill/>
+        </p:spPr>
+        <p:txBody>
+          <a:bodyPr wrap="square" rtlCol="0">
+            <a:spAutoFit/>
+          </a:bodyPr>
+          <a:lstStyle/>
+          <a:p>
+            <a:r>
+              <a:rPr lang="fr-FR" sz="1200" b="1" i="1" dirty="0" smtClean="0">
+                <a:latin typeface="Arial Narrow" pitchFamily="34" charset="0"/>
+                <a:ea typeface="Verdana" pitchFamily="34" charset="0"/>
+              </a:rPr>
+              <a:t>          </a:t>
+            </a:r>
+            <a:r>
+              <a:rPr lang="fr-FR" sz="1200" b="1" i="1" dirty="0" err="1" smtClean="0">
+                <a:latin typeface="Arial Narrow" pitchFamily="34" charset="0"/>
+                <a:ea typeface="Verdana" pitchFamily="34" charset="0"/>
+              </a:rPr>
+              <a:t>SQLite</a:t>
+            </a:r>
+            <a:endParaRPr lang="fr-FR" sz="1200" b="1" i="1" dirty="0" smtClean="0">
+              <a:latin typeface="Arial Narrow" pitchFamily="34" charset="0"/>
+              <a:ea typeface="Verdana" pitchFamily="34" charset="0"/>
+            </a:endParaRPr>
+          </a:p>
+        </p:txBody>
+      </p:sp>
+      <p:grpSp>
+        <p:nvGrpSpPr>
+          <p:cNvPr id="55" name="Groupe 54"/>
+          <p:cNvGrpSpPr/>
+          <p:nvPr/>
+        </p:nvGrpSpPr>
+        <p:grpSpPr>
+          <a:xfrm>
+            <a:off x="-571536" y="2786058"/>
+            <a:ext cx="2143140" cy="369332"/>
+            <a:chOff x="-357222" y="3143248"/>
+            <a:chExt cx="2143140" cy="369332"/>
+          </a:xfrm>
+        </p:grpSpPr>
+        <p:cxnSp>
+          <p:nvCxnSpPr>
+            <p:cNvPr id="53" name="Connecteur droit avec flèche 52"/>
+            <p:cNvCxnSpPr/>
+            <p:nvPr/>
+          </p:nvCxnSpPr>
+          <p:spPr>
+            <a:xfrm>
+              <a:off x="-357222" y="3498850"/>
+              <a:ext cx="2143140" cy="1588"/>
+            </a:xfrm>
+            <a:prstGeom prst="straightConnector1">
+              <a:avLst/>
+            </a:prstGeom>
+            <a:ln w="28575">
+              <a:solidFill>
+                <a:schemeClr val="tx1"/>
+              </a:solidFill>
+              <a:tailEnd type="arrow"/>
+            </a:ln>
+          </p:spPr>
+          <p:style>
+            <a:lnRef idx="1">
+              <a:schemeClr val="accent1"/>
+            </a:lnRef>
+            <a:fillRef idx="0">
+              <a:schemeClr val="accent1"/>
+            </a:fillRef>
+            <a:effectRef idx="0">
+              <a:schemeClr val="accent1"/>
+            </a:effectRef>
+            <a:fontRef idx="minor">
+              <a:schemeClr val="tx1"/>
+            </a:fontRef>
+          </p:style>
+        </p:cxnSp>
+        <p:sp>
+          <p:nvSpPr>
+            <p:cNvPr id="54" name="ZoneTexte 53"/>
+            <p:cNvSpPr txBox="1"/>
+            <p:nvPr/>
+          </p:nvSpPr>
+          <p:spPr>
+            <a:xfrm>
+              <a:off x="-357222" y="3143248"/>
+              <a:ext cx="2000264" cy="369332"/>
+            </a:xfrm>
+            <a:prstGeom prst="rect">
+              <a:avLst/>
+            </a:prstGeom>
+            <a:noFill/>
+          </p:spPr>
+          <p:txBody>
+            <a:bodyPr wrap="square" rtlCol="0">
+              <a:spAutoFit/>
+            </a:bodyPr>
+            <a:lstStyle/>
+            <a:p>
+              <a:pPr algn="ctr"/>
+              <a:r>
+                <a:rPr lang="fr-FR" b="1" i="1" dirty="0" smtClean="0">
+                  <a:latin typeface="Arial Narrow" pitchFamily="34" charset="0"/>
+                </a:rPr>
+                <a:t>Avis</a:t>
+              </a:r>
+              <a:endParaRPr lang="fr-FR" b="1" i="1" dirty="0">
+                <a:latin typeface="Arial Narrow" pitchFamily="34" charset="0"/>
+              </a:endParaRPr>
+            </a:p>
+          </p:txBody>
+        </p:sp>
+      </p:grpSp>
+      <p:cxnSp>
+        <p:nvCxnSpPr>
+          <p:cNvPr id="57" name="Connecteur droit avec flèche 56"/>
+          <p:cNvCxnSpPr/>
+          <p:nvPr/>
+        </p:nvCxnSpPr>
+        <p:spPr>
+          <a:xfrm>
+            <a:off x="3143240" y="3143248"/>
+            <a:ext cx="1143008" cy="1588"/>
+          </a:xfrm>
+          <a:prstGeom prst="straightConnector1">
+            <a:avLst/>
+          </a:prstGeom>
+          <a:ln w="28575">
+            <a:solidFill>
+              <a:schemeClr val="tx1"/>
+            </a:solidFill>
+            <a:tailEnd type="arrow"/>
+          </a:ln>
+        </p:spPr>
+        <p:style>
+          <a:lnRef idx="1">
+            <a:schemeClr val="accent1"/>
+          </a:lnRef>
+          <a:fillRef idx="0">
+            <a:schemeClr val="accent1"/>
+          </a:fillRef>
+          <a:effectRef idx="0">
+            <a:schemeClr val="accent1"/>
+          </a:effectRef>
+          <a:fontRef idx="minor">
+            <a:schemeClr val="tx1"/>
+          </a:fontRef>
+        </p:style>
+      </p:cxnSp>
+      <p:sp>
+        <p:nvSpPr>
+          <p:cNvPr id="58" name="ZoneTexte 57"/>
+          <p:cNvSpPr txBox="1"/>
+          <p:nvPr/>
+        </p:nvSpPr>
+        <p:spPr>
+          <a:xfrm>
+            <a:off x="3428992" y="2773916"/>
+            <a:ext cx="642942" cy="369332"/>
+          </a:xfrm>
+          <a:prstGeom prst="rect">
+            <a:avLst/>
+          </a:prstGeom>
+          <a:noFill/>
+        </p:spPr>
+        <p:txBody>
+          <a:bodyPr wrap="square" rtlCol="0">
+            <a:spAutoFit/>
+          </a:bodyPr>
+          <a:lstStyle/>
+          <a:p>
+            <a:pPr algn="ctr"/>
+            <a:r>
+              <a:rPr lang="fr-FR" b="1" i="1" dirty="0" smtClean="0">
+                <a:latin typeface="Arial Narrow" pitchFamily="34" charset="0"/>
+              </a:rPr>
+              <a:t>Avis</a:t>
+            </a:r>
+            <a:endParaRPr lang="fr-FR" b="1" i="1" dirty="0">
+              <a:latin typeface="Arial Narrow" pitchFamily="34" charset="0"/>
+            </a:endParaRPr>
+          </a:p>
+        </p:txBody>
+      </p:sp>
+      <p:sp>
+        <p:nvSpPr>
+          <p:cNvPr id="60" name="ZoneTexte 59"/>
+          <p:cNvSpPr txBox="1"/>
+          <p:nvPr/>
+        </p:nvSpPr>
+        <p:spPr>
+          <a:xfrm rot="3584237">
+            <a:off x="5876209" y="3571876"/>
+            <a:ext cx="857256" cy="369332"/>
+          </a:xfrm>
+          <a:prstGeom prst="rect">
+            <a:avLst/>
+          </a:prstGeom>
+          <a:noFill/>
+        </p:spPr>
+        <p:txBody>
+          <a:bodyPr wrap="square" rtlCol="0">
+            <a:spAutoFit/>
+          </a:bodyPr>
+          <a:lstStyle/>
+          <a:p>
+            <a:pPr algn="ctr"/>
+            <a:r>
+              <a:rPr lang="fr-FR" b="1" i="1" dirty="0" smtClean="0">
+                <a:latin typeface="Arial Narrow" pitchFamily="34" charset="0"/>
+              </a:rPr>
+              <a:t>Avis</a:t>
+            </a:r>
+            <a:endParaRPr lang="fr-FR" b="1" i="1" dirty="0">
+              <a:latin typeface="Arial Narrow" pitchFamily="34" charset="0"/>
+            </a:endParaRPr>
+          </a:p>
+        </p:txBody>
+      </p:sp>
+      <p:cxnSp>
+        <p:nvCxnSpPr>
+          <p:cNvPr id="61" name="Connecteur droit avec flèche 60"/>
+          <p:cNvCxnSpPr/>
+          <p:nvPr/>
+        </p:nvCxnSpPr>
+        <p:spPr>
+          <a:xfrm rot="16200000" flipH="1">
+            <a:off x="5591333" y="3591076"/>
+            <a:ext cx="1318921" cy="785818"/>
+          </a:xfrm>
+          <a:prstGeom prst="straightConnector1">
+            <a:avLst/>
+          </a:prstGeom>
+          <a:ln w="28575">
+            <a:solidFill>
+              <a:schemeClr val="tx1"/>
+            </a:solidFill>
+            <a:tailEnd type="arrow"/>
+          </a:ln>
+        </p:spPr>
+        <p:style>
+          <a:lnRef idx="1">
+            <a:schemeClr val="accent1"/>
+          </a:lnRef>
+          <a:fillRef idx="0">
+            <a:schemeClr val="accent1"/>
+          </a:fillRef>
+          <a:effectRef idx="0">
+            <a:schemeClr val="accent1"/>
+          </a:effectRef>
+          <a:fontRef idx="minor">
+            <a:schemeClr val="tx1"/>
+          </a:fontRef>
+        </p:style>
+      </p:cxnSp>
+      <p:cxnSp>
+        <p:nvCxnSpPr>
+          <p:cNvPr id="64" name="Connecteur droit avec flèche 63"/>
+          <p:cNvCxnSpPr/>
+          <p:nvPr/>
+        </p:nvCxnSpPr>
+        <p:spPr>
+          <a:xfrm rot="10800000" flipV="1">
+            <a:off x="3143241" y="3571874"/>
+            <a:ext cx="1143011" cy="1"/>
+          </a:xfrm>
+          <a:prstGeom prst="straightConnector1">
+            <a:avLst/>
+          </a:prstGeom>
+          <a:ln w="28575">
+            <a:solidFill>
+              <a:schemeClr val="tx1"/>
+            </a:solidFill>
+            <a:tailEnd type="arrow"/>
+          </a:ln>
+        </p:spPr>
+        <p:style>
+          <a:lnRef idx="1">
+            <a:schemeClr val="accent1"/>
+          </a:lnRef>
+          <a:fillRef idx="0">
+            <a:schemeClr val="accent1"/>
+          </a:fillRef>
+          <a:effectRef idx="0">
+            <a:schemeClr val="accent1"/>
+          </a:effectRef>
+          <a:fontRef idx="minor">
+            <a:schemeClr val="tx1"/>
+          </a:fontRef>
+        </p:style>
+      </p:cxnSp>
+      <p:sp>
+        <p:nvSpPr>
+          <p:cNvPr id="66" name="ZoneTexte 65"/>
+          <p:cNvSpPr txBox="1"/>
+          <p:nvPr/>
+        </p:nvSpPr>
+        <p:spPr>
+          <a:xfrm>
+            <a:off x="3143240" y="3214686"/>
+            <a:ext cx="1143008" cy="369332"/>
+          </a:xfrm>
+          <a:prstGeom prst="rect">
+            <a:avLst/>
+          </a:prstGeom>
+          <a:noFill/>
+        </p:spPr>
+        <p:txBody>
+          <a:bodyPr wrap="square" rtlCol="0">
+            <a:spAutoFit/>
+          </a:bodyPr>
+          <a:lstStyle/>
+          <a:p>
+            <a:pPr algn="r"/>
+            <a:r>
+              <a:rPr lang="fr-FR" b="1" i="1" dirty="0" smtClean="0">
+                <a:latin typeface="Arial Narrow" pitchFamily="34" charset="0"/>
+              </a:rPr>
+              <a:t>Prédiction</a:t>
+            </a:r>
+            <a:endParaRPr lang="fr-FR" b="1" i="1" dirty="0">
+              <a:latin typeface="Arial Narrow" pitchFamily="34" charset="0"/>
+            </a:endParaRPr>
+          </a:p>
+        </p:txBody>
+      </p:sp>
+      <p:cxnSp>
+        <p:nvCxnSpPr>
+          <p:cNvPr id="71" name="Connecteur droit avec flèche 70"/>
+          <p:cNvCxnSpPr>
+            <a:endCxn id="51" idx="1"/>
+          </p:cNvCxnSpPr>
+          <p:nvPr/>
+        </p:nvCxnSpPr>
+        <p:spPr>
+          <a:xfrm flipV="1">
+            <a:off x="5857884" y="1818963"/>
+            <a:ext cx="785818" cy="752781"/>
+          </a:xfrm>
+          <a:prstGeom prst="straightConnector1">
+            <a:avLst/>
+          </a:prstGeom>
+          <a:ln w="28575">
+            <a:solidFill>
+              <a:schemeClr val="tx1"/>
+            </a:solidFill>
+            <a:tailEnd type="arrow"/>
+          </a:ln>
+        </p:spPr>
+        <p:style>
+          <a:lnRef idx="1">
+            <a:schemeClr val="accent1"/>
+          </a:lnRef>
+          <a:fillRef idx="0">
+            <a:schemeClr val="accent1"/>
+          </a:fillRef>
+          <a:effectRef idx="0">
+            <a:schemeClr val="accent1"/>
+          </a:effectRef>
+          <a:fontRef idx="minor">
+            <a:schemeClr val="tx1"/>
+          </a:fontRef>
+        </p:style>
+      </p:cxnSp>
+      <p:cxnSp>
+        <p:nvCxnSpPr>
+          <p:cNvPr id="73" name="Connecteur droit avec flèche 72"/>
+          <p:cNvCxnSpPr/>
+          <p:nvPr/>
+        </p:nvCxnSpPr>
+        <p:spPr>
+          <a:xfrm rot="10800000" flipV="1">
+            <a:off x="5857884" y="2285992"/>
+            <a:ext cx="785818" cy="714380"/>
+          </a:xfrm>
+          <a:prstGeom prst="straightConnector1">
+            <a:avLst/>
+          </a:prstGeom>
+          <a:ln w="28575">
+            <a:solidFill>
+              <a:schemeClr val="tx1"/>
+            </a:solidFill>
+            <a:tailEnd type="arrow"/>
+          </a:ln>
+        </p:spPr>
+        <p:style>
+          <a:lnRef idx="1">
+            <a:schemeClr val="accent1"/>
+          </a:lnRef>
+          <a:fillRef idx="0">
+            <a:schemeClr val="accent1"/>
+          </a:fillRef>
+          <a:effectRef idx="0">
+            <a:schemeClr val="accent1"/>
+          </a:effectRef>
+          <a:fontRef idx="minor">
+            <a:schemeClr val="tx1"/>
+          </a:fontRef>
+        </p:style>
+      </p:cxnSp>
+      <p:sp>
+        <p:nvSpPr>
+          <p:cNvPr id="77" name="ZoneTexte 76"/>
+          <p:cNvSpPr txBox="1"/>
+          <p:nvPr/>
+        </p:nvSpPr>
+        <p:spPr>
+          <a:xfrm rot="18982246">
+            <a:off x="5634531" y="1470729"/>
+            <a:ext cx="857256" cy="1200329"/>
+          </a:xfrm>
+          <a:prstGeom prst="rect">
+            <a:avLst/>
+          </a:prstGeom>
+          <a:noFill/>
+        </p:spPr>
+        <p:txBody>
+          <a:bodyPr wrap="square" rtlCol="0">
+            <a:spAutoFit/>
+          </a:bodyPr>
+          <a:lstStyle/>
+          <a:p>
+            <a:pPr algn="ctr"/>
+            <a:r>
+              <a:rPr lang="fr-FR" b="1" i="1" dirty="0" smtClean="0">
+                <a:latin typeface="Arial Narrow" pitchFamily="34" charset="0"/>
+              </a:rPr>
+              <a:t>Requête Utilisateur</a:t>
+            </a:r>
+            <a:endParaRPr lang="fr-FR" b="1" i="1" dirty="0">
+              <a:latin typeface="Arial Narrow" pitchFamily="34" charset="0"/>
+            </a:endParaRPr>
+          </a:p>
+        </p:txBody>
+      </p:sp>
+    </p:spTree>
+  </p:cSld>
+  <p:clrMapOvr>
+    <a:masterClrMapping/>
+  </p:clrMapOvr>
+</p:sld>
+</file>
+
+<file path=ppt/slides/slide5.xml><?xml version="1.0" encoding="utf-8"?>
+<p:sld xmlns:a="http://schemas.openxmlformats.org/drawingml/2006/main" xmlns:r="http://schemas.openxmlformats.org/officeDocument/2006/relationships" xmlns:p="http://schemas.openxmlformats.org/presentationml/2006/main">
+  <p:cSld>
+    <p:spTree>
+      <p:nvGrpSpPr>
+        <p:cNvPr id="1" name=""/>
+        <p:cNvGrpSpPr/>
+        <p:nvPr/>
+      </p:nvGrpSpPr>
+      <p:grpSpPr>
+        <a:xfrm>
+          <a:off x="0" y="0"/>
+          <a:ext cx="0" cy="0"/>
+          <a:chOff x="0" y="0"/>
+          <a:chExt cx="0" cy="0"/>
+        </a:xfrm>
+      </p:grpSpPr>
+      <p:sp>
+        <p:nvSpPr>
+          <p:cNvPr id="2" name="Titre 1"/>
+          <p:cNvSpPr>
+            <a:spLocks noGrp="1"/>
+          </p:cNvSpPr>
+          <p:nvPr>
+            <p:ph type="title"/>
+          </p:nvPr>
+        </p:nvSpPr>
+        <p:spPr/>
+        <p:txBody>
+          <a:bodyPr>
+            <a:normAutofit/>
+          </a:bodyPr>
+          <a:lstStyle/>
+          <a:p>
+            <a:r>
+              <a:rPr lang="fr-FR" dirty="0" smtClean="0"/>
+              <a:t>Logos</a:t>
+            </a:r>
+            <a:endParaRPr lang="fr-FR" dirty="0"/>
+          </a:p>
+        </p:txBody>
+      </p:sp>
+      <p:pic>
+        <p:nvPicPr>
+          <p:cNvPr id="18434" name="Picture 2" descr="Fichier:Microsoft-Azure.png — Wikipédia"/>
+          <p:cNvPicPr>
+            <a:picLocks noChangeAspect="1" noChangeArrowheads="1"/>
+          </p:cNvPicPr>
+          <p:nvPr/>
+        </p:nvPicPr>
+        <p:blipFill>
+          <a:blip r:embed="rId2" cstate="print"/>
+          <a:srcRect/>
+          <a:stretch>
+            <a:fillRect/>
+          </a:stretch>
+        </p:blipFill>
+        <p:spPr bwMode="auto">
+          <a:xfrm>
+            <a:off x="357166" y="1285860"/>
+            <a:ext cx="1571636" cy="1571636"/>
+          </a:xfrm>
+          <a:prstGeom prst="rect">
+            <a:avLst/>
+          </a:prstGeom>
+          <a:noFill/>
+        </p:spPr>
+      </p:pic>
+      <p:pic>
+        <p:nvPicPr>
+          <p:cNvPr id="18436" name="Picture 4" descr="Formation Flask – Ambient IT"/>
+          <p:cNvPicPr>
+            <a:picLocks noChangeAspect="1" noChangeArrowheads="1"/>
+          </p:cNvPicPr>
+          <p:nvPr/>
+        </p:nvPicPr>
+        <p:blipFill>
+          <a:blip r:embed="rId3"/>
+          <a:srcRect/>
+          <a:stretch>
+            <a:fillRect/>
+          </a:stretch>
+        </p:blipFill>
+        <p:spPr bwMode="auto">
+          <a:xfrm>
+            <a:off x="2428860" y="1142984"/>
+            <a:ext cx="1905000" cy="1666875"/>
+          </a:xfrm>
+          <a:prstGeom prst="rect">
+            <a:avLst/>
+          </a:prstGeom>
+          <a:noFill/>
+        </p:spPr>
+      </p:pic>
+      <p:pic>
+        <p:nvPicPr>
+          <p:cNvPr id="18438" name="Picture 6" descr="Fichier:Python-logo-notext.svg — Wikipédia"/>
+          <p:cNvPicPr>
+            <a:picLocks noChangeAspect="1" noChangeArrowheads="1"/>
+          </p:cNvPicPr>
+          <p:nvPr/>
+        </p:nvPicPr>
+        <p:blipFill>
+          <a:blip r:embed="rId4" cstate="print"/>
+          <a:srcRect b="8824"/>
+          <a:stretch>
+            <a:fillRect/>
+          </a:stretch>
+        </p:blipFill>
+        <p:spPr bwMode="auto">
+          <a:xfrm>
+            <a:off x="5000628" y="1357298"/>
+            <a:ext cx="1644574" cy="1643073"/>
+          </a:xfrm>
+          <a:prstGeom prst="rect">
+            <a:avLst/>
+          </a:prstGeom>
+          <a:noFill/>
+        </p:spPr>
+      </p:pic>
+      <p:pic>
+        <p:nvPicPr>
+          <p:cNvPr id="18440" name="Picture 8" descr="Flask-SQLAlchemy — Flask-SQLAlchemy Documentation (3.0.x)"/>
+          <p:cNvPicPr>
+            <a:picLocks noChangeAspect="1" noChangeArrowheads="1"/>
+          </p:cNvPicPr>
+          <p:nvPr/>
+        </p:nvPicPr>
+        <p:blipFill>
+          <a:blip r:embed="rId5"/>
+          <a:srcRect/>
+          <a:stretch>
+            <a:fillRect/>
+          </a:stretch>
+        </p:blipFill>
+        <p:spPr bwMode="auto">
+          <a:xfrm>
+            <a:off x="428596" y="2857496"/>
+            <a:ext cx="4095750" cy="933450"/>
+          </a:xfrm>
+          <a:prstGeom prst="rect">
+            <a:avLst/>
+          </a:prstGeom>
+          <a:noFill/>
+        </p:spPr>
+      </p:pic>
+      <p:pic>
+        <p:nvPicPr>
+          <p:cNvPr id="18442" name="Picture 10" descr="File:Bootstrap logo.svg - Wikimedia Commons"/>
+          <p:cNvPicPr>
+            <a:picLocks noChangeAspect="1" noChangeArrowheads="1"/>
+          </p:cNvPicPr>
+          <p:nvPr/>
+        </p:nvPicPr>
+        <p:blipFill>
+          <a:blip r:embed="rId6" cstate="print"/>
+          <a:srcRect/>
+          <a:stretch>
+            <a:fillRect/>
+          </a:stretch>
+        </p:blipFill>
+        <p:spPr bwMode="auto">
+          <a:xfrm>
+            <a:off x="7000892" y="1000108"/>
+            <a:ext cx="2689431" cy="2143141"/>
+          </a:xfrm>
+          <a:prstGeom prst="rect">
+            <a:avLst/>
+          </a:prstGeom>
+          <a:noFill/>
+        </p:spPr>
+      </p:pic>
+      <p:pic>
+        <p:nvPicPr>
+          <p:cNvPr id="18444" name="Picture 12" descr="Un Logo en CSS3 sans images - Les Carnets de Byfeel"/>
+          <p:cNvPicPr>
+            <a:picLocks noChangeAspect="1" noChangeArrowheads="1"/>
+          </p:cNvPicPr>
+          <p:nvPr/>
+        </p:nvPicPr>
+        <p:blipFill>
+          <a:blip r:embed="rId7"/>
+          <a:srcRect r="53125"/>
+          <a:stretch>
+            <a:fillRect/>
+          </a:stretch>
+        </p:blipFill>
+        <p:spPr bwMode="auto">
+          <a:xfrm>
+            <a:off x="428596" y="3714752"/>
+            <a:ext cx="1785950" cy="2466975"/>
+          </a:xfrm>
+          <a:prstGeom prst="rect">
+            <a:avLst/>
+          </a:prstGeom>
+          <a:noFill/>
+        </p:spPr>
+      </p:pic>
+      <p:pic>
+        <p:nvPicPr>
+          <p:cNvPr id="9" name="Picture 12" descr="Un Logo en CSS3 sans images - Les Carnets de Byfeel"/>
+          <p:cNvPicPr>
+            <a:picLocks noChangeAspect="1" noChangeArrowheads="1"/>
+          </p:cNvPicPr>
+          <p:nvPr/>
+        </p:nvPicPr>
+        <p:blipFill>
+          <a:blip r:embed="rId7"/>
+          <a:srcRect l="54375"/>
+          <a:stretch>
+            <a:fillRect/>
+          </a:stretch>
+        </p:blipFill>
+        <p:spPr bwMode="auto">
+          <a:xfrm>
+            <a:off x="2285984" y="3714752"/>
+            <a:ext cx="1738298" cy="2466975"/>
+          </a:xfrm>
+          <a:prstGeom prst="rect">
+            <a:avLst/>
+          </a:prstGeom>
+          <a:noFill/>
+        </p:spPr>
+      </p:pic>
+      <p:pic>
+        <p:nvPicPr>
+          <p:cNvPr id="18446" name="Picture 14" descr="File:Sqlite-square-icon.svg - Wikimedia Commons"/>
+          <p:cNvPicPr>
+            <a:picLocks noChangeAspect="1" noChangeArrowheads="1"/>
+          </p:cNvPicPr>
+          <p:nvPr/>
+        </p:nvPicPr>
+        <p:blipFill>
+          <a:blip r:embed="rId8" cstate="print"/>
+          <a:srcRect/>
+          <a:stretch>
+            <a:fillRect/>
+          </a:stretch>
+        </p:blipFill>
+        <p:spPr bwMode="auto">
+          <a:xfrm>
+            <a:off x="4143372" y="4071918"/>
+            <a:ext cx="2214578" cy="2214578"/>
+          </a:xfrm>
+          <a:prstGeom prst="rect">
+            <a:avLst/>
+          </a:prstGeom>
+          <a:noFill/>
+        </p:spPr>
+      </p:pic>
+      <p:sp>
+        <p:nvSpPr>
+          <p:cNvPr id="18448" name="AutoShape 16" descr="Mysql, MySQL Workbench, Ordinateur Icônes PNG - Mysql, MySQL Workbench,  Ordinateur Icônes transparentes | PNG gratuit"/>
+          <p:cNvSpPr>
+            <a:spLocks noChangeAspect="1" noChangeArrowheads="1"/>
+          </p:cNvSpPr>
+          <p:nvPr/>
+        </p:nvSpPr>
+        <p:spPr bwMode="auto">
+          <a:xfrm>
+            <a:off x="155575" y="-144463"/>
+            <a:ext cx="304800" cy="304801"/>
+          </a:xfrm>
+          <a:prstGeom prst="rect">
+            <a:avLst/>
+          </a:prstGeom>
+          <a:noFill/>
+        </p:spPr>
+        <p:txBody>
+          <a:bodyPr vert="horz" wrap="square" lIns="91440" tIns="45720" rIns="91440" bIns="45720" numCol="1" anchor="t" anchorCtr="0" compatLnSpc="1">
+            <a:prstTxWarp prst="textNoShape">
+              <a:avLst/>
+            </a:prstTxWarp>
+          </a:bodyPr>
+          <a:lstStyle/>
+          <a:p>
+            <a:endParaRPr lang="fr-FR"/>
+          </a:p>
+        </p:txBody>
+      </p:sp>
+      <p:sp>
+        <p:nvSpPr>
+          <p:cNvPr id="18450" name="AutoShape 18" descr="Mysql, MySQL Workbench, Ordinateur Icônes PNG - Mysql, MySQL Workbench,  Ordinateur Icônes transparentes | PNG gratuit"/>
+          <p:cNvSpPr>
+            <a:spLocks noChangeAspect="1" noChangeArrowheads="1"/>
+          </p:cNvSpPr>
+          <p:nvPr/>
+        </p:nvSpPr>
+        <p:spPr bwMode="auto">
+          <a:xfrm>
+            <a:off x="155575" y="-144463"/>
+            <a:ext cx="304800" cy="304801"/>
+          </a:xfrm>
+          <a:prstGeom prst="rect">
+            <a:avLst/>
+          </a:prstGeom>
+          <a:noFill/>
+        </p:spPr>
+        <p:txBody>
+          <a:bodyPr vert="horz" wrap="square" lIns="91440" tIns="45720" rIns="91440" bIns="45720" numCol="1" anchor="t" anchorCtr="0" compatLnSpc="1">
+            <a:prstTxWarp prst="textNoShape">
+              <a:avLst/>
+            </a:prstTxWarp>
+          </a:bodyPr>
+          <a:lstStyle/>
+          <a:p>
+            <a:endParaRPr lang="fr-FR"/>
+          </a:p>
+        </p:txBody>
+      </p:sp>
+      <p:pic>
+        <p:nvPicPr>
+          <p:cNvPr id="18454" name="Picture 22" descr="MySQL — Wikipédia"/>
+          <p:cNvPicPr>
+            <a:picLocks noChangeAspect="1" noChangeArrowheads="1"/>
+          </p:cNvPicPr>
+          <p:nvPr/>
+        </p:nvPicPr>
+        <p:blipFill>
+          <a:blip r:embed="rId9"/>
+          <a:srcRect/>
+          <a:stretch>
+            <a:fillRect/>
+          </a:stretch>
+        </p:blipFill>
+        <p:spPr bwMode="auto">
+          <a:xfrm>
+            <a:off x="6143637" y="4001417"/>
+            <a:ext cx="4071966" cy="2107242"/>
+          </a:xfrm>
+          <a:prstGeom prst="rect">
+            <a:avLst/>
+          </a:prstGeom>
+          <a:noFill/>
+        </p:spPr>
+      </p:pic>
     </p:spTree>
   </p:cSld>
   <p:clrMapOvr>

</xml_diff>